<commit_message>
Testing to see if .DS_Store file is removed
</commit_message>
<xml_diff>
--- a/Get_It_Done.pptx
+++ b/Get_It_Done.pptx
@@ -3664,7 +3664,7 @@
           <a:p>
             <a:fld id="{FA743678-E868-4C42-AC69-1F70122D290B}" type="datetimeFigureOut">
               <a:rPr lang="en-US" smtClean="0"/>
-              <a:t>4/25/25</a:t>
+              <a:t>4/26/25</a:t>
             </a:fld>
             <a:endParaRPr lang="en-US"/>
           </a:p>
@@ -3862,7 +3862,7 @@
           <a:p>
             <a:fld id="{FA743678-E868-4C42-AC69-1F70122D290B}" type="datetimeFigureOut">
               <a:rPr lang="en-US" smtClean="0"/>
-              <a:t>4/25/25</a:t>
+              <a:t>4/26/25</a:t>
             </a:fld>
             <a:endParaRPr lang="en-US"/>
           </a:p>
@@ -4070,7 +4070,7 @@
           <a:p>
             <a:fld id="{FA743678-E868-4C42-AC69-1F70122D290B}" type="datetimeFigureOut">
               <a:rPr lang="en-US" smtClean="0"/>
-              <a:t>4/25/25</a:t>
+              <a:t>4/26/25</a:t>
             </a:fld>
             <a:endParaRPr lang="en-US"/>
           </a:p>
@@ -4268,7 +4268,7 @@
           <a:p>
             <a:fld id="{FA743678-E868-4C42-AC69-1F70122D290B}" type="datetimeFigureOut">
               <a:rPr lang="en-US" smtClean="0"/>
-              <a:t>4/25/25</a:t>
+              <a:t>4/26/25</a:t>
             </a:fld>
             <a:endParaRPr lang="en-US"/>
           </a:p>
@@ -4543,7 +4543,7 @@
           <a:p>
             <a:fld id="{FA743678-E868-4C42-AC69-1F70122D290B}" type="datetimeFigureOut">
               <a:rPr lang="en-US" smtClean="0"/>
-              <a:t>4/25/25</a:t>
+              <a:t>4/26/25</a:t>
             </a:fld>
             <a:endParaRPr lang="en-US"/>
           </a:p>
@@ -4808,7 +4808,7 @@
           <a:p>
             <a:fld id="{FA743678-E868-4C42-AC69-1F70122D290B}" type="datetimeFigureOut">
               <a:rPr lang="en-US" smtClean="0"/>
-              <a:t>4/25/25</a:t>
+              <a:t>4/26/25</a:t>
             </a:fld>
             <a:endParaRPr lang="en-US"/>
           </a:p>
@@ -5220,7 +5220,7 @@
           <a:p>
             <a:fld id="{FA743678-E868-4C42-AC69-1F70122D290B}" type="datetimeFigureOut">
               <a:rPr lang="en-US" smtClean="0"/>
-              <a:t>4/25/25</a:t>
+              <a:t>4/26/25</a:t>
             </a:fld>
             <a:endParaRPr lang="en-US"/>
           </a:p>
@@ -5361,7 +5361,7 @@
           <a:p>
             <a:fld id="{FA743678-E868-4C42-AC69-1F70122D290B}" type="datetimeFigureOut">
               <a:rPr lang="en-US" smtClean="0"/>
-              <a:t>4/25/25</a:t>
+              <a:t>4/26/25</a:t>
             </a:fld>
             <a:endParaRPr lang="en-US"/>
           </a:p>
@@ -5474,7 +5474,7 @@
           <a:p>
             <a:fld id="{FA743678-E868-4C42-AC69-1F70122D290B}" type="datetimeFigureOut">
               <a:rPr lang="en-US" smtClean="0"/>
-              <a:t>4/25/25</a:t>
+              <a:t>4/26/25</a:t>
             </a:fld>
             <a:endParaRPr lang="en-US"/>
           </a:p>
@@ -5785,7 +5785,7 @@
           <a:p>
             <a:fld id="{FA743678-E868-4C42-AC69-1F70122D290B}" type="datetimeFigureOut">
               <a:rPr lang="en-US" smtClean="0"/>
-              <a:t>4/25/25</a:t>
+              <a:t>4/26/25</a:t>
             </a:fld>
             <a:endParaRPr lang="en-US"/>
           </a:p>
@@ -6073,7 +6073,7 @@
           <a:p>
             <a:fld id="{FA743678-E868-4C42-AC69-1F70122D290B}" type="datetimeFigureOut">
               <a:rPr lang="en-US" smtClean="0"/>
-              <a:t>4/25/25</a:t>
+              <a:t>4/26/25</a:t>
             </a:fld>
             <a:endParaRPr lang="en-US"/>
           </a:p>
@@ -6314,7 +6314,7 @@
           <a:p>
             <a:fld id="{FA743678-E868-4C42-AC69-1F70122D290B}" type="datetimeFigureOut">
               <a:rPr lang="en-US" smtClean="0"/>
-              <a:t>4/25/25</a:t>
+              <a:t>4/26/25</a:t>
             </a:fld>
             <a:endParaRPr lang="en-US"/>
           </a:p>
@@ -6777,7 +6777,11 @@
             </a:br>
             <a:r>
               <a:rPr lang="en-US" sz="1800" i="1" dirty="0"/>
-              <a:t>(Helps users stay motivated and productive by tracking tasks and progress with encouragement.)</a:t>
+              <a:t>(Helps users stay motivated and productive by tracking tasks and progress with </a:t>
+            </a:r>
+            <a:r>
+              <a:rPr lang="en-US" sz="1800" i="1"/>
+              <a:t>encouragement.) </a:t>
             </a:r>
             <a:endParaRPr lang="en-US" dirty="0"/>
           </a:p>

</xml_diff>

<commit_message>
Finalized Repo and PPT for Presentation
</commit_message>
<xml_diff>
--- a/Get_It_Done.pptx
+++ b/Get_It_Done.pptx
@@ -4,13 +4,17 @@
   <p:sldMasterIdLst>
     <p:sldMasterId id="2147483648" r:id="rId1"/>
   </p:sldMasterIdLst>
+  <p:notesMasterIdLst>
+    <p:notesMasterId r:id="rId9"/>
+  </p:notesMasterIdLst>
   <p:sldIdLst>
-    <p:sldId id="256" r:id="rId2"/>
-    <p:sldId id="257" r:id="rId3"/>
-    <p:sldId id="258" r:id="rId4"/>
-    <p:sldId id="259" r:id="rId5"/>
-    <p:sldId id="260" r:id="rId6"/>
-    <p:sldId id="261" r:id="rId7"/>
+    <p:sldId id="262" r:id="rId2"/>
+    <p:sldId id="256" r:id="rId3"/>
+    <p:sldId id="257" r:id="rId4"/>
+    <p:sldId id="258" r:id="rId5"/>
+    <p:sldId id="259" r:id="rId6"/>
+    <p:sldId id="260" r:id="rId7"/>
+    <p:sldId id="261" r:id="rId8"/>
   </p:sldIdLst>
   <p:sldSz cx="12192000" cy="6858000"/>
   <p:notesSz cx="6858000" cy="9144000"/>
@@ -923,7 +927,7 @@
         <a:lstStyle/>
         <a:p>
           <a:r>
-            <a:rPr lang="en-US"/>
+            <a:rPr lang="en-US" dirty="0"/>
             <a:t>Add and complete tasks</a:t>
           </a:r>
         </a:p>
@@ -959,7 +963,7 @@
         <a:lstStyle/>
         <a:p>
           <a:r>
-            <a:rPr lang="en-US"/>
+            <a:rPr lang="en-US" dirty="0"/>
             <a:t>Motivational popups appear randomly</a:t>
           </a:r>
         </a:p>
@@ -995,7 +999,7 @@
         <a:lstStyle/>
         <a:p>
           <a:r>
-            <a:rPr lang="en-US"/>
+            <a:rPr lang="en-US" dirty="0"/>
             <a:t>Progress updates automatically</a:t>
           </a:r>
         </a:p>
@@ -1031,7 +1035,7 @@
         <a:lstStyle/>
         <a:p>
           <a:r>
-            <a:rPr lang="en-US"/>
+            <a:rPr lang="en-US" dirty="0"/>
             <a:t>Save, load tasks, and set color themes</a:t>
           </a:r>
         </a:p>
@@ -1067,7 +1071,7 @@
         <a:lstStyle/>
         <a:p>
           <a:r>
-            <a:rPr lang="en-US"/>
+            <a:rPr lang="en-US" dirty="0"/>
             <a:t>(Screen share the app live here)</a:t>
           </a:r>
         </a:p>
@@ -1568,7 +1572,7 @@
             <a:buNone/>
           </a:pPr>
           <a:r>
-            <a:rPr lang="en-US" sz="1900" kern="1200"/>
+            <a:rPr lang="en-US" sz="1900" kern="1200" dirty="0"/>
             <a:t>Add and complete tasks</a:t>
           </a:r>
         </a:p>
@@ -1720,7 +1724,7 @@
             <a:buNone/>
           </a:pPr>
           <a:r>
-            <a:rPr lang="en-US" sz="1900" kern="1200"/>
+            <a:rPr lang="en-US" sz="1900" kern="1200" dirty="0"/>
             <a:t>Motivational popups appear randomly</a:t>
           </a:r>
         </a:p>
@@ -1872,7 +1876,7 @@
             <a:buNone/>
           </a:pPr>
           <a:r>
-            <a:rPr lang="en-US" sz="1900" kern="1200"/>
+            <a:rPr lang="en-US" sz="1900" kern="1200" dirty="0"/>
             <a:t>Progress updates automatically</a:t>
           </a:r>
         </a:p>
@@ -2024,7 +2028,7 @@
             <a:buNone/>
           </a:pPr>
           <a:r>
-            <a:rPr lang="en-US" sz="1900" kern="1200"/>
+            <a:rPr lang="en-US" sz="1900" kern="1200" dirty="0"/>
             <a:t>Save, load tasks, and set color themes</a:t>
           </a:r>
         </a:p>
@@ -2176,7 +2180,7 @@
             <a:buNone/>
           </a:pPr>
           <a:r>
-            <a:rPr lang="en-US" sz="1900" kern="1200"/>
+            <a:rPr lang="en-US" sz="1900" kern="1200" dirty="0"/>
             <a:t>(Screen share the app live here)</a:t>
           </a:r>
         </a:p>
@@ -3518,6 +3522,523 @@
 </dgm:styleDef>
 </file>
 
+<file path=ppt/notesMasters/notesMaster1.xml><?xml version="1.0" encoding="utf-8"?>
+<p:notesMaster xmlns:a="http://schemas.openxmlformats.org/drawingml/2006/main" xmlns:r="http://schemas.openxmlformats.org/officeDocument/2006/relationships" xmlns:p="http://schemas.openxmlformats.org/presentationml/2006/main">
+  <p:cSld>
+    <p:bg>
+      <p:bgRef idx="1001">
+        <a:schemeClr val="bg1"/>
+      </p:bgRef>
+    </p:bg>
+    <p:spTree>
+      <p:nvGrpSpPr>
+        <p:cNvPr id="1" name=""/>
+        <p:cNvGrpSpPr/>
+        <p:nvPr/>
+      </p:nvGrpSpPr>
+      <p:grpSpPr>
+        <a:xfrm>
+          <a:off x="0" y="0"/>
+          <a:ext cx="0" cy="0"/>
+          <a:chOff x="0" y="0"/>
+          <a:chExt cx="0" cy="0"/>
+        </a:xfrm>
+      </p:grpSpPr>
+      <p:sp>
+        <p:nvSpPr>
+          <p:cNvPr id="2" name="Header Placeholder 1"/>
+          <p:cNvSpPr>
+            <a:spLocks noGrp="1"/>
+          </p:cNvSpPr>
+          <p:nvPr>
+            <p:ph type="hdr" sz="quarter"/>
+          </p:nvPr>
+        </p:nvSpPr>
+        <p:spPr>
+          <a:xfrm>
+            <a:off x="0" y="0"/>
+            <a:ext cx="2971800" cy="458788"/>
+          </a:xfrm>
+          <a:prstGeom prst="rect">
+            <a:avLst/>
+          </a:prstGeom>
+        </p:spPr>
+        <p:txBody>
+          <a:bodyPr vert="horz" lIns="91440" tIns="45720" rIns="91440" bIns="45720" rtlCol="0"/>
+          <a:lstStyle>
+            <a:lvl1pPr algn="l">
+              <a:defRPr sz="1200"/>
+            </a:lvl1pPr>
+          </a:lstStyle>
+          <a:p>
+            <a:endParaRPr lang="en-US"/>
+          </a:p>
+        </p:txBody>
+      </p:sp>
+      <p:sp>
+        <p:nvSpPr>
+          <p:cNvPr id="3" name="Date Placeholder 2"/>
+          <p:cNvSpPr>
+            <a:spLocks noGrp="1"/>
+          </p:cNvSpPr>
+          <p:nvPr>
+            <p:ph type="dt" idx="1"/>
+          </p:nvPr>
+        </p:nvSpPr>
+        <p:spPr>
+          <a:xfrm>
+            <a:off x="3884613" y="0"/>
+            <a:ext cx="2971800" cy="458788"/>
+          </a:xfrm>
+          <a:prstGeom prst="rect">
+            <a:avLst/>
+          </a:prstGeom>
+        </p:spPr>
+        <p:txBody>
+          <a:bodyPr vert="horz" lIns="91440" tIns="45720" rIns="91440" bIns="45720" rtlCol="0"/>
+          <a:lstStyle>
+            <a:lvl1pPr algn="r">
+              <a:defRPr sz="1200"/>
+            </a:lvl1pPr>
+          </a:lstStyle>
+          <a:p>
+            <a:fld id="{BFC49662-0B9C-A049-AC2D-60B76AA86811}" type="datetimeFigureOut">
+              <a:rPr lang="en-US" smtClean="0"/>
+              <a:t>5/1/25</a:t>
+            </a:fld>
+            <a:endParaRPr lang="en-US"/>
+          </a:p>
+        </p:txBody>
+      </p:sp>
+      <p:sp>
+        <p:nvSpPr>
+          <p:cNvPr id="4" name="Slide Image Placeholder 3"/>
+          <p:cNvSpPr>
+            <a:spLocks noGrp="1" noRot="1" noChangeAspect="1"/>
+          </p:cNvSpPr>
+          <p:nvPr>
+            <p:ph type="sldImg" idx="2"/>
+          </p:nvPr>
+        </p:nvSpPr>
+        <p:spPr>
+          <a:xfrm>
+            <a:off x="685800" y="1143000"/>
+            <a:ext cx="5486400" cy="3086100"/>
+          </a:xfrm>
+          <a:prstGeom prst="rect">
+            <a:avLst/>
+          </a:prstGeom>
+          <a:noFill/>
+          <a:ln w="12700">
+            <a:solidFill>
+              <a:prstClr val="black"/>
+            </a:solidFill>
+          </a:ln>
+        </p:spPr>
+        <p:txBody>
+          <a:bodyPr vert="horz" lIns="91440" tIns="45720" rIns="91440" bIns="45720" rtlCol="0" anchor="ctr"/>
+          <a:lstStyle/>
+          <a:p>
+            <a:endParaRPr lang="en-US"/>
+          </a:p>
+        </p:txBody>
+      </p:sp>
+      <p:sp>
+        <p:nvSpPr>
+          <p:cNvPr id="5" name="Notes Placeholder 4"/>
+          <p:cNvSpPr>
+            <a:spLocks noGrp="1"/>
+          </p:cNvSpPr>
+          <p:nvPr>
+            <p:ph type="body" sz="quarter" idx="3"/>
+          </p:nvPr>
+        </p:nvSpPr>
+        <p:spPr>
+          <a:xfrm>
+            <a:off x="685800" y="4400550"/>
+            <a:ext cx="5486400" cy="3600450"/>
+          </a:xfrm>
+          <a:prstGeom prst="rect">
+            <a:avLst/>
+          </a:prstGeom>
+        </p:spPr>
+        <p:txBody>
+          <a:bodyPr vert="horz" lIns="91440" tIns="45720" rIns="91440" bIns="45720" rtlCol="0"/>
+          <a:lstStyle/>
+          <a:p>
+            <a:pPr lvl="0"/>
+            <a:r>
+              <a:rPr lang="en-US"/>
+              <a:t>Click to edit Master text styles</a:t>
+            </a:r>
+          </a:p>
+          <a:p>
+            <a:pPr lvl="1"/>
+            <a:r>
+              <a:rPr lang="en-US"/>
+              <a:t>Second level</a:t>
+            </a:r>
+          </a:p>
+          <a:p>
+            <a:pPr lvl="2"/>
+            <a:r>
+              <a:rPr lang="en-US"/>
+              <a:t>Third level</a:t>
+            </a:r>
+          </a:p>
+          <a:p>
+            <a:pPr lvl="3"/>
+            <a:r>
+              <a:rPr lang="en-US"/>
+              <a:t>Fourth level</a:t>
+            </a:r>
+          </a:p>
+          <a:p>
+            <a:pPr lvl="4"/>
+            <a:r>
+              <a:rPr lang="en-US"/>
+              <a:t>Fifth level</a:t>
+            </a:r>
+          </a:p>
+        </p:txBody>
+      </p:sp>
+      <p:sp>
+        <p:nvSpPr>
+          <p:cNvPr id="6" name="Footer Placeholder 5"/>
+          <p:cNvSpPr>
+            <a:spLocks noGrp="1"/>
+          </p:cNvSpPr>
+          <p:nvPr>
+            <p:ph type="ftr" sz="quarter" idx="4"/>
+          </p:nvPr>
+        </p:nvSpPr>
+        <p:spPr>
+          <a:xfrm>
+            <a:off x="0" y="8685213"/>
+            <a:ext cx="2971800" cy="458787"/>
+          </a:xfrm>
+          <a:prstGeom prst="rect">
+            <a:avLst/>
+          </a:prstGeom>
+        </p:spPr>
+        <p:txBody>
+          <a:bodyPr vert="horz" lIns="91440" tIns="45720" rIns="91440" bIns="45720" rtlCol="0" anchor="b"/>
+          <a:lstStyle>
+            <a:lvl1pPr algn="l">
+              <a:defRPr sz="1200"/>
+            </a:lvl1pPr>
+          </a:lstStyle>
+          <a:p>
+            <a:endParaRPr lang="en-US"/>
+          </a:p>
+        </p:txBody>
+      </p:sp>
+      <p:sp>
+        <p:nvSpPr>
+          <p:cNvPr id="7" name="Slide Number Placeholder 6"/>
+          <p:cNvSpPr>
+            <a:spLocks noGrp="1"/>
+          </p:cNvSpPr>
+          <p:nvPr>
+            <p:ph type="sldNum" sz="quarter" idx="5"/>
+          </p:nvPr>
+        </p:nvSpPr>
+        <p:spPr>
+          <a:xfrm>
+            <a:off x="3884613" y="8685213"/>
+            <a:ext cx="2971800" cy="458787"/>
+          </a:xfrm>
+          <a:prstGeom prst="rect">
+            <a:avLst/>
+          </a:prstGeom>
+        </p:spPr>
+        <p:txBody>
+          <a:bodyPr vert="horz" lIns="91440" tIns="45720" rIns="91440" bIns="45720" rtlCol="0" anchor="b"/>
+          <a:lstStyle>
+            <a:lvl1pPr algn="r">
+              <a:defRPr sz="1200"/>
+            </a:lvl1pPr>
+          </a:lstStyle>
+          <a:p>
+            <a:fld id="{39D66EB8-24D8-1941-AB76-F2447AF26C5D}" type="slidenum">
+              <a:rPr lang="en-US" smtClean="0"/>
+              <a:t>‹#›</a:t>
+            </a:fld>
+            <a:endParaRPr lang="en-US"/>
+          </a:p>
+        </p:txBody>
+      </p:sp>
+    </p:spTree>
+    <p:extLst>
+      <p:ext uri="{BB962C8B-B14F-4D97-AF65-F5344CB8AC3E}">
+        <p14:creationId xmlns:p14="http://schemas.microsoft.com/office/powerpoint/2010/main" val="1544384033"/>
+      </p:ext>
+    </p:extLst>
+  </p:cSld>
+  <p:clrMap bg1="lt1" tx1="dk1" bg2="lt2" tx2="dk2" accent1="accent1" accent2="accent2" accent3="accent3" accent4="accent4" accent5="accent5" accent6="accent6" hlink="hlink" folHlink="folHlink"/>
+  <p:notesStyle>
+    <a:lvl1pPr marL="0" algn="l" defTabSz="914400" rtl="0" eaLnBrk="1" latinLnBrk="0" hangingPunct="1">
+      <a:defRPr sz="1200" kern="1200">
+        <a:solidFill>
+          <a:schemeClr val="tx1"/>
+        </a:solidFill>
+        <a:latin typeface="+mn-lt"/>
+        <a:ea typeface="+mn-ea"/>
+        <a:cs typeface="+mn-cs"/>
+      </a:defRPr>
+    </a:lvl1pPr>
+    <a:lvl2pPr marL="457200" algn="l" defTabSz="914400" rtl="0" eaLnBrk="1" latinLnBrk="0" hangingPunct="1">
+      <a:defRPr sz="1200" kern="1200">
+        <a:solidFill>
+          <a:schemeClr val="tx1"/>
+        </a:solidFill>
+        <a:latin typeface="+mn-lt"/>
+        <a:ea typeface="+mn-ea"/>
+        <a:cs typeface="+mn-cs"/>
+      </a:defRPr>
+    </a:lvl2pPr>
+    <a:lvl3pPr marL="914400" algn="l" defTabSz="914400" rtl="0" eaLnBrk="1" latinLnBrk="0" hangingPunct="1">
+      <a:defRPr sz="1200" kern="1200">
+        <a:solidFill>
+          <a:schemeClr val="tx1"/>
+        </a:solidFill>
+        <a:latin typeface="+mn-lt"/>
+        <a:ea typeface="+mn-ea"/>
+        <a:cs typeface="+mn-cs"/>
+      </a:defRPr>
+    </a:lvl3pPr>
+    <a:lvl4pPr marL="1371600" algn="l" defTabSz="914400" rtl="0" eaLnBrk="1" latinLnBrk="0" hangingPunct="1">
+      <a:defRPr sz="1200" kern="1200">
+        <a:solidFill>
+          <a:schemeClr val="tx1"/>
+        </a:solidFill>
+        <a:latin typeface="+mn-lt"/>
+        <a:ea typeface="+mn-ea"/>
+        <a:cs typeface="+mn-cs"/>
+      </a:defRPr>
+    </a:lvl4pPr>
+    <a:lvl5pPr marL="1828800" algn="l" defTabSz="914400" rtl="0" eaLnBrk="1" latinLnBrk="0" hangingPunct="1">
+      <a:defRPr sz="1200" kern="1200">
+        <a:solidFill>
+          <a:schemeClr val="tx1"/>
+        </a:solidFill>
+        <a:latin typeface="+mn-lt"/>
+        <a:ea typeface="+mn-ea"/>
+        <a:cs typeface="+mn-cs"/>
+      </a:defRPr>
+    </a:lvl5pPr>
+    <a:lvl6pPr marL="2286000" algn="l" defTabSz="914400" rtl="0" eaLnBrk="1" latinLnBrk="0" hangingPunct="1">
+      <a:defRPr sz="1200" kern="1200">
+        <a:solidFill>
+          <a:schemeClr val="tx1"/>
+        </a:solidFill>
+        <a:latin typeface="+mn-lt"/>
+        <a:ea typeface="+mn-ea"/>
+        <a:cs typeface="+mn-cs"/>
+      </a:defRPr>
+    </a:lvl6pPr>
+    <a:lvl7pPr marL="2743200" algn="l" defTabSz="914400" rtl="0" eaLnBrk="1" latinLnBrk="0" hangingPunct="1">
+      <a:defRPr sz="1200" kern="1200">
+        <a:solidFill>
+          <a:schemeClr val="tx1"/>
+        </a:solidFill>
+        <a:latin typeface="+mn-lt"/>
+        <a:ea typeface="+mn-ea"/>
+        <a:cs typeface="+mn-cs"/>
+      </a:defRPr>
+    </a:lvl7pPr>
+    <a:lvl8pPr marL="3200400" algn="l" defTabSz="914400" rtl="0" eaLnBrk="1" latinLnBrk="0" hangingPunct="1">
+      <a:defRPr sz="1200" kern="1200">
+        <a:solidFill>
+          <a:schemeClr val="tx1"/>
+        </a:solidFill>
+        <a:latin typeface="+mn-lt"/>
+        <a:ea typeface="+mn-ea"/>
+        <a:cs typeface="+mn-cs"/>
+      </a:defRPr>
+    </a:lvl8pPr>
+    <a:lvl9pPr marL="3657600" algn="l" defTabSz="914400" rtl="0" eaLnBrk="1" latinLnBrk="0" hangingPunct="1">
+      <a:defRPr sz="1200" kern="1200">
+        <a:solidFill>
+          <a:schemeClr val="tx1"/>
+        </a:solidFill>
+        <a:latin typeface="+mn-lt"/>
+        <a:ea typeface="+mn-ea"/>
+        <a:cs typeface="+mn-cs"/>
+      </a:defRPr>
+    </a:lvl9pPr>
+  </p:notesStyle>
+</p:notesMaster>
+</file>
+
+<file path=ppt/notesSlides/notesSlide1.xml><?xml version="1.0" encoding="utf-8"?>
+<p:notes xmlns:a="http://schemas.openxmlformats.org/drawingml/2006/main" xmlns:r="http://schemas.openxmlformats.org/officeDocument/2006/relationships" xmlns:p="http://schemas.openxmlformats.org/presentationml/2006/main">
+  <p:cSld>
+    <p:spTree>
+      <p:nvGrpSpPr>
+        <p:cNvPr id="1" name=""/>
+        <p:cNvGrpSpPr/>
+        <p:nvPr/>
+      </p:nvGrpSpPr>
+      <p:grpSpPr>
+        <a:xfrm>
+          <a:off x="0" y="0"/>
+          <a:ext cx="0" cy="0"/>
+          <a:chOff x="0" y="0"/>
+          <a:chExt cx="0" cy="0"/>
+        </a:xfrm>
+      </p:grpSpPr>
+      <p:sp>
+        <p:nvSpPr>
+          <p:cNvPr id="2" name="Slide Image Placeholder 1"/>
+          <p:cNvSpPr>
+            <a:spLocks noGrp="1" noRot="1" noChangeAspect="1"/>
+          </p:cNvSpPr>
+          <p:nvPr>
+            <p:ph type="sldImg"/>
+          </p:nvPr>
+        </p:nvSpPr>
+        <p:spPr/>
+      </p:sp>
+      <p:sp>
+        <p:nvSpPr>
+          <p:cNvPr id="3" name="Notes Placeholder 2"/>
+          <p:cNvSpPr>
+            <a:spLocks noGrp="1"/>
+          </p:cNvSpPr>
+          <p:nvPr>
+            <p:ph type="body" idx="1"/>
+          </p:nvPr>
+        </p:nvSpPr>
+        <p:spPr/>
+        <p:txBody>
+          <a:bodyPr/>
+          <a:lstStyle/>
+          <a:p>
+            <a:endParaRPr lang="en-US" dirty="0"/>
+          </a:p>
+        </p:txBody>
+      </p:sp>
+      <p:sp>
+        <p:nvSpPr>
+          <p:cNvPr id="4" name="Slide Number Placeholder 3"/>
+          <p:cNvSpPr>
+            <a:spLocks noGrp="1"/>
+          </p:cNvSpPr>
+          <p:nvPr>
+            <p:ph type="sldNum" sz="quarter" idx="5"/>
+          </p:nvPr>
+        </p:nvSpPr>
+        <p:spPr/>
+        <p:txBody>
+          <a:bodyPr/>
+          <a:lstStyle/>
+          <a:p>
+            <a:fld id="{39D66EB8-24D8-1941-AB76-F2447AF26C5D}" type="slidenum">
+              <a:rPr lang="en-US" smtClean="0"/>
+              <a:t>2</a:t>
+            </a:fld>
+            <a:endParaRPr lang="en-US"/>
+          </a:p>
+        </p:txBody>
+      </p:sp>
+    </p:spTree>
+    <p:extLst>
+      <p:ext uri="{BB962C8B-B14F-4D97-AF65-F5344CB8AC3E}">
+        <p14:creationId xmlns:p14="http://schemas.microsoft.com/office/powerpoint/2010/main" val="2003819434"/>
+      </p:ext>
+    </p:extLst>
+  </p:cSld>
+  <p:clrMapOvr>
+    <a:masterClrMapping/>
+  </p:clrMapOvr>
+</p:notes>
+</file>
+
+<file path=ppt/notesSlides/notesSlide2.xml><?xml version="1.0" encoding="utf-8"?>
+<p:notes xmlns:a="http://schemas.openxmlformats.org/drawingml/2006/main" xmlns:r="http://schemas.openxmlformats.org/officeDocument/2006/relationships" xmlns:p="http://schemas.openxmlformats.org/presentationml/2006/main">
+  <p:cSld>
+    <p:spTree>
+      <p:nvGrpSpPr>
+        <p:cNvPr id="1" name=""/>
+        <p:cNvGrpSpPr/>
+        <p:nvPr/>
+      </p:nvGrpSpPr>
+      <p:grpSpPr>
+        <a:xfrm>
+          <a:off x="0" y="0"/>
+          <a:ext cx="0" cy="0"/>
+          <a:chOff x="0" y="0"/>
+          <a:chExt cx="0" cy="0"/>
+        </a:xfrm>
+      </p:grpSpPr>
+      <p:sp>
+        <p:nvSpPr>
+          <p:cNvPr id="2" name="Slide Image Placeholder 1"/>
+          <p:cNvSpPr>
+            <a:spLocks noGrp="1" noRot="1" noChangeAspect="1"/>
+          </p:cNvSpPr>
+          <p:nvPr>
+            <p:ph type="sldImg"/>
+          </p:nvPr>
+        </p:nvSpPr>
+        <p:spPr/>
+      </p:sp>
+      <p:sp>
+        <p:nvSpPr>
+          <p:cNvPr id="3" name="Notes Placeholder 2"/>
+          <p:cNvSpPr>
+            <a:spLocks noGrp="1"/>
+          </p:cNvSpPr>
+          <p:nvPr>
+            <p:ph type="body" idx="1"/>
+          </p:nvPr>
+        </p:nvSpPr>
+        <p:spPr/>
+        <p:txBody>
+          <a:bodyPr/>
+          <a:lstStyle/>
+          <a:p>
+            <a:endParaRPr lang="en-US" dirty="0"/>
+          </a:p>
+        </p:txBody>
+      </p:sp>
+      <p:sp>
+        <p:nvSpPr>
+          <p:cNvPr id="4" name="Slide Number Placeholder 3"/>
+          <p:cNvSpPr>
+            <a:spLocks noGrp="1"/>
+          </p:cNvSpPr>
+          <p:nvPr>
+            <p:ph type="sldNum" sz="quarter" idx="5"/>
+          </p:nvPr>
+        </p:nvSpPr>
+        <p:spPr/>
+        <p:txBody>
+          <a:bodyPr/>
+          <a:lstStyle/>
+          <a:p>
+            <a:fld id="{39D66EB8-24D8-1941-AB76-F2447AF26C5D}" type="slidenum">
+              <a:rPr lang="en-US" smtClean="0"/>
+              <a:t>7</a:t>
+            </a:fld>
+            <a:endParaRPr lang="en-US"/>
+          </a:p>
+        </p:txBody>
+      </p:sp>
+    </p:spTree>
+    <p:extLst>
+      <p:ext uri="{BB962C8B-B14F-4D97-AF65-F5344CB8AC3E}">
+        <p14:creationId xmlns:p14="http://schemas.microsoft.com/office/powerpoint/2010/main" val="3151532534"/>
+      </p:ext>
+    </p:extLst>
+  </p:cSld>
+  <p:clrMapOvr>
+    <a:masterClrMapping/>
+  </p:clrMapOvr>
+</p:notes>
+</file>
+
 <file path=ppt/slideLayouts/slideLayout1.xml><?xml version="1.0" encoding="utf-8"?>
 <p:sldLayout xmlns:a="http://schemas.openxmlformats.org/drawingml/2006/main" xmlns:r="http://schemas.openxmlformats.org/officeDocument/2006/relationships" xmlns:p="http://schemas.openxmlformats.org/presentationml/2006/main" type="title" preserve="1">
   <p:cSld name="Title Slide">
@@ -3665,9 +4186,9 @@
           <a:p>
             <a:fld id="{FA743678-E868-4C42-AC69-1F70122D290B}" type="datetimeFigureOut">
               <a:rPr lang="en-US" smtClean="0"/>
-              <a:t>4/27/25</a:t>
+              <a:t>4/30/25</a:t>
             </a:fld>
-            <a:endParaRPr lang="en-US"/>
+            <a:endParaRPr lang="en-US" dirty="0"/>
           </a:p>
         </p:txBody>
       </p:sp>
@@ -3692,7 +4213,7 @@
           <a:bodyPr/>
           <a:lstStyle/>
           <a:p>
-            <a:endParaRPr lang="en-US"/>
+            <a:endParaRPr lang="en-US" dirty="0"/>
           </a:p>
         </p:txBody>
       </p:sp>
@@ -3721,7 +4242,7 @@
               <a:rPr lang="en-US" smtClean="0"/>
               <a:t>‹#›</a:t>
             </a:fld>
-            <a:endParaRPr lang="en-US"/>
+            <a:endParaRPr lang="en-US" dirty="0"/>
           </a:p>
         </p:txBody>
       </p:sp>
@@ -3863,9 +4384,9 @@
           <a:p>
             <a:fld id="{FA743678-E868-4C42-AC69-1F70122D290B}" type="datetimeFigureOut">
               <a:rPr lang="en-US" smtClean="0"/>
-              <a:t>4/27/25</a:t>
+              <a:t>4/30/25</a:t>
             </a:fld>
-            <a:endParaRPr lang="en-US"/>
+            <a:endParaRPr lang="en-US" dirty="0"/>
           </a:p>
         </p:txBody>
       </p:sp>
@@ -3890,7 +4411,7 @@
           <a:bodyPr/>
           <a:lstStyle/>
           <a:p>
-            <a:endParaRPr lang="en-US"/>
+            <a:endParaRPr lang="en-US" dirty="0"/>
           </a:p>
         </p:txBody>
       </p:sp>
@@ -3919,7 +4440,7 @@
               <a:rPr lang="en-US" smtClean="0"/>
               <a:t>‹#›</a:t>
             </a:fld>
-            <a:endParaRPr lang="en-US"/>
+            <a:endParaRPr lang="en-US" dirty="0"/>
           </a:p>
         </p:txBody>
       </p:sp>
@@ -4071,9 +4592,9 @@
           <a:p>
             <a:fld id="{FA743678-E868-4C42-AC69-1F70122D290B}" type="datetimeFigureOut">
               <a:rPr lang="en-US" smtClean="0"/>
-              <a:t>4/27/25</a:t>
+              <a:t>4/30/25</a:t>
             </a:fld>
-            <a:endParaRPr lang="en-US"/>
+            <a:endParaRPr lang="en-US" dirty="0"/>
           </a:p>
         </p:txBody>
       </p:sp>
@@ -4098,7 +4619,7 @@
           <a:bodyPr/>
           <a:lstStyle/>
           <a:p>
-            <a:endParaRPr lang="en-US"/>
+            <a:endParaRPr lang="en-US" dirty="0"/>
           </a:p>
         </p:txBody>
       </p:sp>
@@ -4127,7 +4648,7 @@
               <a:rPr lang="en-US" smtClean="0"/>
               <a:t>‹#›</a:t>
             </a:fld>
-            <a:endParaRPr lang="en-US"/>
+            <a:endParaRPr lang="en-US" dirty="0"/>
           </a:p>
         </p:txBody>
       </p:sp>
@@ -4269,9 +4790,9 @@
           <a:p>
             <a:fld id="{FA743678-E868-4C42-AC69-1F70122D290B}" type="datetimeFigureOut">
               <a:rPr lang="en-US" smtClean="0"/>
-              <a:t>4/27/25</a:t>
+              <a:t>4/30/25</a:t>
             </a:fld>
-            <a:endParaRPr lang="en-US"/>
+            <a:endParaRPr lang="en-US" dirty="0"/>
           </a:p>
         </p:txBody>
       </p:sp>
@@ -4296,7 +4817,7 @@
           <a:bodyPr/>
           <a:lstStyle/>
           <a:p>
-            <a:endParaRPr lang="en-US"/>
+            <a:endParaRPr lang="en-US" dirty="0"/>
           </a:p>
         </p:txBody>
       </p:sp>
@@ -4325,7 +4846,7 @@
               <a:rPr lang="en-US" smtClean="0"/>
               <a:t>‹#›</a:t>
             </a:fld>
-            <a:endParaRPr lang="en-US"/>
+            <a:endParaRPr lang="en-US" dirty="0"/>
           </a:p>
         </p:txBody>
       </p:sp>
@@ -4544,9 +5065,9 @@
           <a:p>
             <a:fld id="{FA743678-E868-4C42-AC69-1F70122D290B}" type="datetimeFigureOut">
               <a:rPr lang="en-US" smtClean="0"/>
-              <a:t>4/27/25</a:t>
+              <a:t>4/30/25</a:t>
             </a:fld>
-            <a:endParaRPr lang="en-US"/>
+            <a:endParaRPr lang="en-US" dirty="0"/>
           </a:p>
         </p:txBody>
       </p:sp>
@@ -4571,7 +5092,7 @@
           <a:bodyPr/>
           <a:lstStyle/>
           <a:p>
-            <a:endParaRPr lang="en-US"/>
+            <a:endParaRPr lang="en-US" dirty="0"/>
           </a:p>
         </p:txBody>
       </p:sp>
@@ -4600,7 +5121,7 @@
               <a:rPr lang="en-US" smtClean="0"/>
               <a:t>‹#›</a:t>
             </a:fld>
-            <a:endParaRPr lang="en-US"/>
+            <a:endParaRPr lang="en-US" dirty="0"/>
           </a:p>
         </p:txBody>
       </p:sp>
@@ -4809,9 +5330,9 @@
           <a:p>
             <a:fld id="{FA743678-E868-4C42-AC69-1F70122D290B}" type="datetimeFigureOut">
               <a:rPr lang="en-US" smtClean="0"/>
-              <a:t>4/27/25</a:t>
+              <a:t>4/30/25</a:t>
             </a:fld>
-            <a:endParaRPr lang="en-US"/>
+            <a:endParaRPr lang="en-US" dirty="0"/>
           </a:p>
         </p:txBody>
       </p:sp>
@@ -4836,7 +5357,7 @@
           <a:bodyPr/>
           <a:lstStyle/>
           <a:p>
-            <a:endParaRPr lang="en-US"/>
+            <a:endParaRPr lang="en-US" dirty="0"/>
           </a:p>
         </p:txBody>
       </p:sp>
@@ -4865,7 +5386,7 @@
               <a:rPr lang="en-US" smtClean="0"/>
               <a:t>‹#›</a:t>
             </a:fld>
-            <a:endParaRPr lang="en-US"/>
+            <a:endParaRPr lang="en-US" dirty="0"/>
           </a:p>
         </p:txBody>
       </p:sp>
@@ -5221,9 +5742,9 @@
           <a:p>
             <a:fld id="{FA743678-E868-4C42-AC69-1F70122D290B}" type="datetimeFigureOut">
               <a:rPr lang="en-US" smtClean="0"/>
-              <a:t>4/27/25</a:t>
+              <a:t>4/30/25</a:t>
             </a:fld>
-            <a:endParaRPr lang="en-US"/>
+            <a:endParaRPr lang="en-US" dirty="0"/>
           </a:p>
         </p:txBody>
       </p:sp>
@@ -5248,7 +5769,7 @@
           <a:bodyPr/>
           <a:lstStyle/>
           <a:p>
-            <a:endParaRPr lang="en-US"/>
+            <a:endParaRPr lang="en-US" dirty="0"/>
           </a:p>
         </p:txBody>
       </p:sp>
@@ -5277,7 +5798,7 @@
               <a:rPr lang="en-US" smtClean="0"/>
               <a:t>‹#›</a:t>
             </a:fld>
-            <a:endParaRPr lang="en-US"/>
+            <a:endParaRPr lang="en-US" dirty="0"/>
           </a:p>
         </p:txBody>
       </p:sp>
@@ -5362,9 +5883,9 @@
           <a:p>
             <a:fld id="{FA743678-E868-4C42-AC69-1F70122D290B}" type="datetimeFigureOut">
               <a:rPr lang="en-US" smtClean="0"/>
-              <a:t>4/27/25</a:t>
+              <a:t>4/30/25</a:t>
             </a:fld>
-            <a:endParaRPr lang="en-US"/>
+            <a:endParaRPr lang="en-US" dirty="0"/>
           </a:p>
         </p:txBody>
       </p:sp>
@@ -5389,7 +5910,7 @@
           <a:bodyPr/>
           <a:lstStyle/>
           <a:p>
-            <a:endParaRPr lang="en-US"/>
+            <a:endParaRPr lang="en-US" dirty="0"/>
           </a:p>
         </p:txBody>
       </p:sp>
@@ -5418,7 +5939,7 @@
               <a:rPr lang="en-US" smtClean="0"/>
               <a:t>‹#›</a:t>
             </a:fld>
-            <a:endParaRPr lang="en-US"/>
+            <a:endParaRPr lang="en-US" dirty="0"/>
           </a:p>
         </p:txBody>
       </p:sp>
@@ -5475,9 +5996,9 @@
           <a:p>
             <a:fld id="{FA743678-E868-4C42-AC69-1F70122D290B}" type="datetimeFigureOut">
               <a:rPr lang="en-US" smtClean="0"/>
-              <a:t>4/27/25</a:t>
+              <a:t>4/30/25</a:t>
             </a:fld>
-            <a:endParaRPr lang="en-US"/>
+            <a:endParaRPr lang="en-US" dirty="0"/>
           </a:p>
         </p:txBody>
       </p:sp>
@@ -5502,7 +6023,7 @@
           <a:bodyPr/>
           <a:lstStyle/>
           <a:p>
-            <a:endParaRPr lang="en-US"/>
+            <a:endParaRPr lang="en-US" dirty="0"/>
           </a:p>
         </p:txBody>
       </p:sp>
@@ -5531,7 +6052,7 @@
               <a:rPr lang="en-US" smtClean="0"/>
               <a:t>‹#›</a:t>
             </a:fld>
-            <a:endParaRPr lang="en-US"/>
+            <a:endParaRPr lang="en-US" dirty="0"/>
           </a:p>
         </p:txBody>
       </p:sp>
@@ -5786,9 +6307,9 @@
           <a:p>
             <a:fld id="{FA743678-E868-4C42-AC69-1F70122D290B}" type="datetimeFigureOut">
               <a:rPr lang="en-US" smtClean="0"/>
-              <a:t>4/27/25</a:t>
+              <a:t>4/30/25</a:t>
             </a:fld>
-            <a:endParaRPr lang="en-US"/>
+            <a:endParaRPr lang="en-US" dirty="0"/>
           </a:p>
         </p:txBody>
       </p:sp>
@@ -5813,7 +6334,7 @@
           <a:bodyPr/>
           <a:lstStyle/>
           <a:p>
-            <a:endParaRPr lang="en-US"/>
+            <a:endParaRPr lang="en-US" dirty="0"/>
           </a:p>
         </p:txBody>
       </p:sp>
@@ -5842,7 +6363,7 @@
               <a:rPr lang="en-US" smtClean="0"/>
               <a:t>‹#›</a:t>
             </a:fld>
-            <a:endParaRPr lang="en-US"/>
+            <a:endParaRPr lang="en-US" dirty="0"/>
           </a:p>
         </p:txBody>
       </p:sp>
@@ -5976,7 +6497,7 @@
             </a:lvl9pPr>
           </a:lstStyle>
           <a:p>
-            <a:endParaRPr lang="en-US"/>
+            <a:endParaRPr lang="en-US" dirty="0"/>
           </a:p>
         </p:txBody>
       </p:sp>
@@ -6074,9 +6595,9 @@
           <a:p>
             <a:fld id="{FA743678-E868-4C42-AC69-1F70122D290B}" type="datetimeFigureOut">
               <a:rPr lang="en-US" smtClean="0"/>
-              <a:t>4/27/25</a:t>
+              <a:t>4/30/25</a:t>
             </a:fld>
-            <a:endParaRPr lang="en-US"/>
+            <a:endParaRPr lang="en-US" dirty="0"/>
           </a:p>
         </p:txBody>
       </p:sp>
@@ -6101,7 +6622,7 @@
           <a:bodyPr/>
           <a:lstStyle/>
           <a:p>
-            <a:endParaRPr lang="en-US"/>
+            <a:endParaRPr lang="en-US" dirty="0"/>
           </a:p>
         </p:txBody>
       </p:sp>
@@ -6130,7 +6651,7 @@
               <a:rPr lang="en-US" smtClean="0"/>
               <a:t>‹#›</a:t>
             </a:fld>
-            <a:endParaRPr lang="en-US"/>
+            <a:endParaRPr lang="en-US" dirty="0"/>
           </a:p>
         </p:txBody>
       </p:sp>
@@ -6315,9 +6836,9 @@
           <a:p>
             <a:fld id="{FA743678-E868-4C42-AC69-1F70122D290B}" type="datetimeFigureOut">
               <a:rPr lang="en-US" smtClean="0"/>
-              <a:t>4/27/25</a:t>
+              <a:t>4/30/25</a:t>
             </a:fld>
-            <a:endParaRPr lang="en-US"/>
+            <a:endParaRPr lang="en-US" dirty="0"/>
           </a:p>
         </p:txBody>
       </p:sp>
@@ -6360,7 +6881,7 @@
             </a:lvl1pPr>
           </a:lstStyle>
           <a:p>
-            <a:endParaRPr lang="en-US"/>
+            <a:endParaRPr lang="en-US" dirty="0"/>
           </a:p>
         </p:txBody>
       </p:sp>
@@ -6407,7 +6928,7 @@
               <a:rPr lang="en-US" smtClean="0"/>
               <a:t>‹#›</a:t>
             </a:fld>
-            <a:endParaRPr lang="en-US"/>
+            <a:endParaRPr lang="en-US" dirty="0"/>
           </a:p>
         </p:txBody>
       </p:sp>
@@ -6740,6 +7261,379 @@
           <a:chExt cx="0" cy="0"/>
         </a:xfrm>
       </p:grpSpPr>
+      <p:sp useBgFill="1">
+        <p:nvSpPr>
+          <p:cNvPr id="8" name="Rectangle 7">
+            <a:extLst>
+              <a:ext uri="{FF2B5EF4-FFF2-40B4-BE49-F238E27FC236}">
+                <a16:creationId xmlns:a16="http://schemas.microsoft.com/office/drawing/2014/main" id="{907EF6B7-1338-4443-8C46-6A318D952DFD}"/>
+              </a:ext>
+              <a:ext uri="{C183D7F6-B498-43B3-948B-1728B52AA6E4}">
+                <adec:decorative xmlns:adec="http://schemas.microsoft.com/office/drawing/2017/decorative" val="1"/>
+              </a:ext>
+            </a:extLst>
+          </p:cNvPr>
+          <p:cNvSpPr>
+            <a:spLocks noGrp="1" noRot="1" noChangeAspect="1" noMove="1" noResize="1" noEditPoints="1" noAdjustHandles="1" noChangeArrowheads="1" noChangeShapeType="1" noTextEdit="1"/>
+          </p:cNvSpPr>
+          <p:nvPr>
+            <p:extLst>
+              <p:ext uri="{386F3935-93C4-4BCD-93E2-E3B085C9AB24}">
+                <p16:designElem xmlns:p16="http://schemas.microsoft.com/office/powerpoint/2015/main" val="1"/>
+              </p:ext>
+            </p:extLst>
+          </p:nvPr>
+        </p:nvSpPr>
+        <p:spPr>
+          <a:xfrm>
+            <a:off x="3048" y="0"/>
+            <a:ext cx="12188952" cy="6858000"/>
+          </a:xfrm>
+          <a:prstGeom prst="rect">
+            <a:avLst/>
+          </a:prstGeom>
+          <a:ln>
+            <a:noFill/>
+          </a:ln>
+        </p:spPr>
+        <p:style>
+          <a:lnRef idx="2">
+            <a:schemeClr val="accent1">
+              <a:shade val="50000"/>
+            </a:schemeClr>
+          </a:lnRef>
+          <a:fillRef idx="1">
+            <a:schemeClr val="accent1"/>
+          </a:fillRef>
+          <a:effectRef idx="0">
+            <a:schemeClr val="accent1"/>
+          </a:effectRef>
+          <a:fontRef idx="minor">
+            <a:schemeClr val="lt1"/>
+          </a:fontRef>
+        </p:style>
+        <p:txBody>
+          <a:bodyPr rtlCol="0" anchor="ctr"/>
+          <a:lstStyle/>
+          <a:p>
+            <a:pPr algn="ctr"/>
+            <a:endParaRPr lang="en-US"/>
+          </a:p>
+        </p:txBody>
+      </p:sp>
+      <p:sp>
+        <p:nvSpPr>
+          <p:cNvPr id="20" name="Freeform: Shape 9">
+            <a:extLst>
+              <a:ext uri="{FF2B5EF4-FFF2-40B4-BE49-F238E27FC236}">
+                <a16:creationId xmlns:a16="http://schemas.microsoft.com/office/drawing/2014/main" id="{DAAE4CDD-124C-4DCF-9584-B6033B545DD5}"/>
+              </a:ext>
+              <a:ext uri="{C183D7F6-B498-43B3-948B-1728B52AA6E4}">
+                <adec:decorative xmlns:adec="http://schemas.microsoft.com/office/drawing/2017/decorative" val="1"/>
+              </a:ext>
+            </a:extLst>
+          </p:cNvPr>
+          <p:cNvSpPr>
+            <a:spLocks noGrp="1" noRot="1" noChangeAspect="1" noMove="1" noResize="1" noEditPoints="1" noAdjustHandles="1" noChangeArrowheads="1" noChangeShapeType="1" noTextEdit="1"/>
+          </p:cNvSpPr>
+          <p:nvPr>
+            <p:extLst>
+              <p:ext uri="{386F3935-93C4-4BCD-93E2-E3B085C9AB24}">
+                <p16:designElem xmlns:p16="http://schemas.microsoft.com/office/powerpoint/2015/main" val="1"/>
+              </p:ext>
+            </p:extLst>
+          </p:nvPr>
+        </p:nvSpPr>
+        <p:spPr>
+          <a:xfrm>
+            <a:off x="1" y="0"/>
+            <a:ext cx="4167271" cy="6858000"/>
+          </a:xfrm>
+          <a:custGeom>
+            <a:avLst/>
+            <a:gdLst>
+              <a:gd name="connsiteX0" fmla="*/ 0 w 4167271"/>
+              <a:gd name="connsiteY0" fmla="*/ 0 h 6858000"/>
+              <a:gd name="connsiteX1" fmla="*/ 2259550 w 4167271"/>
+              <a:gd name="connsiteY1" fmla="*/ 0 h 6858000"/>
+              <a:gd name="connsiteX2" fmla="*/ 2387803 w 4167271"/>
+              <a:gd name="connsiteY2" fmla="*/ 82222 h 6858000"/>
+              <a:gd name="connsiteX3" fmla="*/ 4167271 w 4167271"/>
+              <a:gd name="connsiteY3" fmla="*/ 3429000 h 6858000"/>
+              <a:gd name="connsiteX4" fmla="*/ 2387803 w 4167271"/>
+              <a:gd name="connsiteY4" fmla="*/ 6775779 h 6858000"/>
+              <a:gd name="connsiteX5" fmla="*/ 2259550 w 4167271"/>
+              <a:gd name="connsiteY5" fmla="*/ 6858000 h 6858000"/>
+              <a:gd name="connsiteX6" fmla="*/ 0 w 4167271"/>
+              <a:gd name="connsiteY6" fmla="*/ 6858000 h 6858000"/>
+            </a:gdLst>
+            <a:ahLst/>
+            <a:cxnLst>
+              <a:cxn ang="0">
+                <a:pos x="connsiteX0" y="connsiteY0"/>
+              </a:cxn>
+              <a:cxn ang="0">
+                <a:pos x="connsiteX1" y="connsiteY1"/>
+              </a:cxn>
+              <a:cxn ang="0">
+                <a:pos x="connsiteX2" y="connsiteY2"/>
+              </a:cxn>
+              <a:cxn ang="0">
+                <a:pos x="connsiteX3" y="connsiteY3"/>
+              </a:cxn>
+              <a:cxn ang="0">
+                <a:pos x="connsiteX4" y="connsiteY4"/>
+              </a:cxn>
+              <a:cxn ang="0">
+                <a:pos x="connsiteX5" y="connsiteY5"/>
+              </a:cxn>
+              <a:cxn ang="0">
+                <a:pos x="connsiteX6" y="connsiteY6"/>
+              </a:cxn>
+            </a:cxnLst>
+            <a:rect l="l" t="t" r="r" b="b"/>
+            <a:pathLst>
+              <a:path w="4167271" h="6858000">
+                <a:moveTo>
+                  <a:pt x="0" y="0"/>
+                </a:moveTo>
+                <a:lnTo>
+                  <a:pt x="2259550" y="0"/>
+                </a:lnTo>
+                <a:lnTo>
+                  <a:pt x="2387803" y="82222"/>
+                </a:lnTo>
+                <a:cubicBezTo>
+                  <a:pt x="3461407" y="807534"/>
+                  <a:pt x="4167271" y="2035835"/>
+                  <a:pt x="4167271" y="3429000"/>
+                </a:cubicBezTo>
+                <a:cubicBezTo>
+                  <a:pt x="4167271" y="4822165"/>
+                  <a:pt x="3461407" y="6050467"/>
+                  <a:pt x="2387803" y="6775779"/>
+                </a:cubicBezTo>
+                <a:lnTo>
+                  <a:pt x="2259550" y="6858000"/>
+                </a:lnTo>
+                <a:lnTo>
+                  <a:pt x="0" y="6858000"/>
+                </a:lnTo>
+                <a:close/>
+              </a:path>
+            </a:pathLst>
+          </a:custGeom>
+          <a:solidFill>
+            <a:schemeClr val="accent2"/>
+          </a:solidFill>
+          <a:ln>
+            <a:noFill/>
+          </a:ln>
+        </p:spPr>
+        <p:style>
+          <a:lnRef idx="2">
+            <a:schemeClr val="accent1">
+              <a:shade val="50000"/>
+            </a:schemeClr>
+          </a:lnRef>
+          <a:fillRef idx="1">
+            <a:schemeClr val="accent1"/>
+          </a:fillRef>
+          <a:effectRef idx="0">
+            <a:schemeClr val="accent1"/>
+          </a:effectRef>
+          <a:fontRef idx="minor">
+            <a:schemeClr val="lt1"/>
+          </a:fontRef>
+        </p:style>
+        <p:txBody>
+          <a:bodyPr rtlCol="0" anchor="ctr"/>
+          <a:lstStyle/>
+          <a:p>
+            <a:pPr algn="ctr"/>
+            <a:endParaRPr lang="en-US"/>
+          </a:p>
+        </p:txBody>
+      </p:sp>
+      <p:sp>
+        <p:nvSpPr>
+          <p:cNvPr id="2" name="Title 1">
+            <a:extLst>
+              <a:ext uri="{FF2B5EF4-FFF2-40B4-BE49-F238E27FC236}">
+                <a16:creationId xmlns:a16="http://schemas.microsoft.com/office/drawing/2014/main" id="{8CD7E54B-F61F-7691-09B4-26F585956B40}"/>
+              </a:ext>
+            </a:extLst>
+          </p:cNvPr>
+          <p:cNvSpPr>
+            <a:spLocks noGrp="1"/>
+          </p:cNvSpPr>
+          <p:nvPr>
+            <p:ph type="title"/>
+          </p:nvPr>
+        </p:nvSpPr>
+        <p:spPr>
+          <a:xfrm>
+            <a:off x="686834" y="1153572"/>
+            <a:ext cx="3200400" cy="4461163"/>
+          </a:xfrm>
+        </p:spPr>
+        <p:txBody>
+          <a:bodyPr>
+            <a:normAutofit/>
+          </a:bodyPr>
+          <a:lstStyle/>
+          <a:p>
+            <a:r>
+              <a:rPr lang="en-US">
+                <a:solidFill>
+                  <a:srgbClr val="FFFFFF"/>
+                </a:solidFill>
+              </a:rPr>
+              <a:t>NOTICE!</a:t>
+            </a:r>
+          </a:p>
+        </p:txBody>
+      </p:sp>
+      <p:sp>
+        <p:nvSpPr>
+          <p:cNvPr id="21" name="Arc 20">
+            <a:extLst>
+              <a:ext uri="{FF2B5EF4-FFF2-40B4-BE49-F238E27FC236}">
+                <a16:creationId xmlns:a16="http://schemas.microsoft.com/office/drawing/2014/main" id="{081E4A58-353D-44AE-B2FC-2A74E2E400F7}"/>
+              </a:ext>
+              <a:ext uri="{C183D7F6-B498-43B3-948B-1728B52AA6E4}">
+                <adec:decorative xmlns:adec="http://schemas.microsoft.com/office/drawing/2017/decorative" val="1"/>
+              </a:ext>
+            </a:extLst>
+          </p:cNvPr>
+          <p:cNvSpPr>
+            <a:spLocks noGrp="1" noRot="1" noChangeAspect="1" noMove="1" noResize="1" noEditPoints="1" noAdjustHandles="1" noChangeArrowheads="1" noChangeShapeType="1" noTextEdit="1"/>
+          </p:cNvSpPr>
+          <p:nvPr>
+            <p:extLst>
+              <p:ext uri="{386F3935-93C4-4BCD-93E2-E3B085C9AB24}">
+                <p16:designElem xmlns:p16="http://schemas.microsoft.com/office/powerpoint/2015/main" val="1"/>
+              </p:ext>
+            </p:extLst>
+          </p:nvPr>
+        </p:nvSpPr>
+        <p:spPr>
+          <a:xfrm flipV="1">
+            <a:off x="7550402" y="2455479"/>
+            <a:ext cx="4083433" cy="4083433"/>
+          </a:xfrm>
+          <a:prstGeom prst="arc">
+            <a:avLst/>
+          </a:prstGeom>
+          <a:ln w="127000" cap="rnd">
+            <a:solidFill>
+              <a:schemeClr val="accent4"/>
+            </a:solidFill>
+            <a:prstDash val="dash"/>
+          </a:ln>
+        </p:spPr>
+        <p:style>
+          <a:lnRef idx="1">
+            <a:schemeClr val="accent1"/>
+          </a:lnRef>
+          <a:fillRef idx="0">
+            <a:schemeClr val="accent1"/>
+          </a:fillRef>
+          <a:effectRef idx="0">
+            <a:schemeClr val="accent1"/>
+          </a:effectRef>
+          <a:fontRef idx="minor">
+            <a:schemeClr val="tx1"/>
+          </a:fontRef>
+        </p:style>
+        <p:txBody>
+          <a:bodyPr rtlCol="0" anchor="ctr"/>
+          <a:lstStyle/>
+          <a:p>
+            <a:pPr algn="ctr"/>
+            <a:endParaRPr lang="en-US" dirty="0"/>
+          </a:p>
+        </p:txBody>
+      </p:sp>
+      <p:sp>
+        <p:nvSpPr>
+          <p:cNvPr id="3" name="Content Placeholder 2">
+            <a:extLst>
+              <a:ext uri="{FF2B5EF4-FFF2-40B4-BE49-F238E27FC236}">
+                <a16:creationId xmlns:a16="http://schemas.microsoft.com/office/drawing/2014/main" id="{2D514EDA-4785-39A4-255F-88A68E12AE7B}"/>
+              </a:ext>
+            </a:extLst>
+          </p:cNvPr>
+          <p:cNvSpPr>
+            <a:spLocks noGrp="1"/>
+          </p:cNvSpPr>
+          <p:nvPr>
+            <p:ph idx="1"/>
+          </p:nvPr>
+        </p:nvSpPr>
+        <p:spPr>
+          <a:xfrm>
+            <a:off x="4447308" y="591344"/>
+            <a:ext cx="6906491" cy="5585619"/>
+          </a:xfrm>
+        </p:spPr>
+        <p:txBody>
+          <a:bodyPr anchor="ctr">
+            <a:normAutofit/>
+          </a:bodyPr>
+          <a:lstStyle/>
+          <a:p>
+            <a:r>
+              <a:rPr lang="en-US" dirty="0"/>
+              <a:t>I have a speech delay, which causes me to speak at a slow pace, and makes it difficult for others to understand what I’m saying. Therefore, I have  pre-recorded what I would say on each side, except the Live Demo slide, and increased the speed,  so that it will be easier to understand.</a:t>
+            </a:r>
+          </a:p>
+          <a:p>
+            <a:r>
+              <a:rPr lang="en-US" dirty="0"/>
+              <a:t>For the Live Demo, please bare with me, as I will have difficulty speaking while demonstrating the program.</a:t>
+            </a:r>
+          </a:p>
+        </p:txBody>
+      </p:sp>
+    </p:spTree>
+    <p:extLst>
+      <p:ext uri="{BB962C8B-B14F-4D97-AF65-F5344CB8AC3E}">
+        <p14:creationId xmlns:p14="http://schemas.microsoft.com/office/powerpoint/2010/main" val="3213214908"/>
+      </p:ext>
+    </p:extLst>
+  </p:cSld>
+  <p:clrMapOvr>
+    <a:masterClrMapping/>
+  </p:clrMapOvr>
+</p:sld>
+</file>
+
+<file path=ppt/slides/slide2.xml><?xml version="1.0" encoding="utf-8"?>
+<p:sld xmlns:a="http://schemas.openxmlformats.org/drawingml/2006/main" xmlns:r="http://schemas.openxmlformats.org/officeDocument/2006/relationships" xmlns:p="http://schemas.openxmlformats.org/presentationml/2006/main">
+  <p:cSld>
+    <p:bg>
+      <p:bgPr>
+        <a:solidFill>
+          <a:schemeClr val="bg1"/>
+        </a:solidFill>
+        <a:effectLst/>
+      </p:bgPr>
+    </p:bg>
+    <p:spTree>
+      <p:nvGrpSpPr>
+        <p:cNvPr id="1" name=""/>
+        <p:cNvGrpSpPr/>
+        <p:nvPr/>
+      </p:nvGrpSpPr>
+      <p:grpSpPr>
+        <a:xfrm>
+          <a:off x="0" y="0"/>
+          <a:ext cx="0" cy="0"/>
+          <a:chOff x="0" y="0"/>
+          <a:chExt cx="0" cy="0"/>
+        </a:xfrm>
+      </p:grpSpPr>
       <p:sp>
         <p:nvSpPr>
           <p:cNvPr id="2" name="Title 1">
@@ -6778,11 +7672,7 @@
             </a:br>
             <a:r>
               <a:rPr lang="en-US" sz="1800" i="1" dirty="0"/>
-              <a:t>(Helps users stay motivated and productive by tracking tasks and progress with </a:t>
-            </a:r>
-            <a:r>
-              <a:rPr lang="en-US" sz="1800" i="1"/>
-              <a:t>encouragement.) </a:t>
+              <a:t>(Helps users stay motivated and productive by tracking tasks and progress with encouragement.) </a:t>
             </a:r>
             <a:endParaRPr lang="en-US" dirty="0"/>
           </a:p>
@@ -6826,7 +7716,7 @@
             <a:pPr algn="r"/>
             <a:r>
               <a:rPr lang="en-US" sz="1800" dirty="0">
-                <a:hlinkClick r:id="rId2"/>
+                <a:hlinkClick r:id="rId5"/>
               </a:rPr>
               <a:t>https://github.com/ksu-is/Get_It_Done/tree/main</a:t>
             </a:r>
@@ -6852,7 +7742,7 @@
           <p:nvPr/>
         </p:nvPicPr>
         <p:blipFill>
-          <a:blip r:embed="rId3"/>
+          <a:blip r:embed="rId6"/>
           <a:srcRect l="1187" t="-1459" r="1189" b="12537"/>
           <a:stretch/>
         </p:blipFill>
@@ -6881,7 +7771,7 @@
           <p:nvPr/>
         </p:nvPicPr>
         <p:blipFill>
-          <a:blip r:embed="rId4">
+          <a:blip r:embed="rId7">
             <a:extLst>
               <a:ext uri="{28A0092B-C50C-407E-A947-70E740481C1C}">
                 <a14:useLocalDpi xmlns:a14="http://schemas.microsoft.com/office/drawing/2010/main" val="0"/>
@@ -6926,7 +7816,7 @@
           <p:nvPr/>
         </p:nvPicPr>
         <p:blipFill>
-          <a:blip r:embed="rId5"/>
+          <a:blip r:embed="rId8"/>
           <a:srcRect l="-389" t="44650" r="393" b="-2176"/>
           <a:stretch/>
         </p:blipFill>
@@ -7036,7 +7926,7 @@
             <a:lstStyle/>
             <a:p>
               <a:pPr algn="ctr"/>
-              <a:endParaRPr lang="en-US"/>
+              <a:endParaRPr lang="en-US" dirty="0"/>
             </a:p>
           </p:txBody>
         </p:sp>
@@ -7110,11 +8000,51 @@
             <a:lstStyle/>
             <a:p>
               <a:pPr algn="ctr"/>
-              <a:endParaRPr lang="en-US"/>
+              <a:endParaRPr lang="en-US" dirty="0"/>
             </a:p>
           </p:txBody>
         </p:sp>
       </p:grpSp>
+      <p:pic>
+        <p:nvPicPr>
+          <p:cNvPr id="5" name="Audio Recording Apr 30, 2025 at 9:23:33 PM">
+            <a:hlinkClick r:id="" action="ppaction://media"/>
+            <a:extLst>
+              <a:ext uri="{FF2B5EF4-FFF2-40B4-BE49-F238E27FC236}">
+                <a16:creationId xmlns:a16="http://schemas.microsoft.com/office/drawing/2014/main" id="{5BB5A888-2558-8B5E-ADD0-93A417E0C1FD}"/>
+              </a:ext>
+            </a:extLst>
+          </p:cNvPr>
+          <p:cNvPicPr>
+            <a:picLocks noChangeAspect="1"/>
+          </p:cNvPicPr>
+          <p:nvPr>
+            <a:audioFile r:link="rId1"/>
+            <p:extLst>
+              <p:ext uri="{DAA4B4D4-6D71-4841-9C94-3DE7FCFB9230}">
+                <p14:media xmlns:p14="http://schemas.microsoft.com/office/powerpoint/2010/main" r:embed="rId2">
+                  <p14:trim st="18165.9799" end="6258.6857"/>
+                </p14:media>
+              </p:ext>
+            </p:extLst>
+          </p:nvPr>
+        </p:nvPicPr>
+        <p:blipFill>
+          <a:blip r:embed="rId9"/>
+          <a:stretch>
+            <a:fillRect/>
+          </a:stretch>
+        </p:blipFill>
+        <p:spPr>
+          <a:xfrm>
+            <a:off x="45544" y="6088990"/>
+            <a:ext cx="812800" cy="812800"/>
+          </a:xfrm>
+          <a:prstGeom prst="rect">
+            <a:avLst/>
+          </a:prstGeom>
+        </p:spPr>
+      </p:pic>
     </p:spTree>
     <p:extLst>
       <p:ext uri="{BB962C8B-B14F-4D97-AF65-F5344CB8AC3E}">
@@ -7125,10 +8055,97 @@
   <p:clrMapOvr>
     <a:masterClrMapping/>
   </p:clrMapOvr>
+  <p:timing>
+    <p:tnLst>
+      <p:par>
+        <p:cTn id="1" dur="indefinite" restart="never" nodeType="tmRoot">
+          <p:childTnLst>
+            <p:seq concurrent="1" nextAc="seek">
+              <p:cTn id="2" dur="indefinite" nodeType="mainSeq">
+                <p:childTnLst>
+                  <p:par>
+                    <p:cTn id="3" fill="hold">
+                      <p:stCondLst>
+                        <p:cond delay="indefinite"/>
+                        <p:cond evt="onBegin" delay="0">
+                          <p:tn val="2"/>
+                        </p:cond>
+                      </p:stCondLst>
+                      <p:childTnLst>
+                        <p:par>
+                          <p:cTn id="4" fill="hold">
+                            <p:stCondLst>
+                              <p:cond delay="0"/>
+                            </p:stCondLst>
+                            <p:childTnLst>
+                              <p:par>
+                                <p:cTn id="5" presetID="1" presetClass="mediacall" presetSubtype="0" fill="hold" nodeType="afterEffect">
+                                  <p:stCondLst>
+                                    <p:cond delay="0"/>
+                                  </p:stCondLst>
+                                  <p:childTnLst>
+                                    <p:cmd type="call" cmd="playFrom(0.0)">
+                                      <p:cBhvr>
+                                        <p:cTn id="6" dur="22099" fill="hold"/>
+                                        <p:tgtEl>
+                                          <p:spTgt spid="5"/>
+                                        </p:tgtEl>
+                                      </p:cBhvr>
+                                    </p:cmd>
+                                  </p:childTnLst>
+                                </p:cTn>
+                              </p:par>
+                            </p:childTnLst>
+                          </p:cTn>
+                        </p:par>
+                      </p:childTnLst>
+                    </p:cTn>
+                  </p:par>
+                </p:childTnLst>
+              </p:cTn>
+              <p:prevCondLst>
+                <p:cond evt="onPrev" delay="0">
+                  <p:tgtEl>
+                    <p:sldTgt/>
+                  </p:tgtEl>
+                </p:cond>
+              </p:prevCondLst>
+              <p:nextCondLst>
+                <p:cond evt="onNext" delay="0">
+                  <p:tgtEl>
+                    <p:sldTgt/>
+                  </p:tgtEl>
+                </p:cond>
+              </p:nextCondLst>
+            </p:seq>
+            <p:audio>
+              <p:cMediaNode vol="80000">
+                <p:cTn id="7" fill="hold" display="0">
+                  <p:stCondLst>
+                    <p:cond delay="indefinite"/>
+                  </p:stCondLst>
+                  <p:endCondLst>
+                    <p:cond evt="onStopAudio" delay="0">
+                      <p:tgtEl>
+                        <p:sldTgt/>
+                      </p:tgtEl>
+                    </p:cond>
+                  </p:endCondLst>
+                </p:cTn>
+                <p:tgtEl>
+                  <p:spTgt spid="5"/>
+                </p:tgtEl>
+              </p:cMediaNode>
+            </p:audio>
+          </p:childTnLst>
+        </p:cTn>
+      </p:par>
+    </p:tnLst>
+  </p:timing>
 </p:sld>
 </file>
 
-<file path=ppt/slides/slide2.xml><?xml version="1.0" encoding="utf-8"?>
+<file path=ppt/slides/slide3.xml><?xml version="1.0" encoding="utf-8"?>
 <p:sld xmlns:a="http://schemas.openxmlformats.org/drawingml/2006/main" xmlns:r="http://schemas.openxmlformats.org/officeDocument/2006/relationships" xmlns:p="http://schemas.openxmlformats.org/presentationml/2006/main">
   <p:cSld>
     <p:bg>
@@ -7303,7 +8320,7 @@
           </a:lstStyle>
           <a:p>
             <a:pPr algn="ctr"/>
-            <a:endParaRPr lang="en-US"/>
+            <a:endParaRPr lang="en-US" dirty="0"/>
           </a:p>
         </p:txBody>
       </p:sp>
@@ -7370,7 +8387,7 @@
           <a:lstStyle/>
           <a:p>
             <a:pPr algn="ctr"/>
-            <a:endParaRPr lang="en-US"/>
+            <a:endParaRPr lang="en-US" dirty="0"/>
           </a:p>
         </p:txBody>
       </p:sp>
@@ -7397,7 +8414,7 @@
           <a:lstStyle/>
           <a:p>
             <a:r>
-              <a:rPr lang="en-US" sz="4000"/>
+              <a:rPr lang="en-US" sz="4000" dirty="0"/>
               <a:t>Project Idea</a:t>
             </a:r>
           </a:p>
@@ -7425,14 +8442,14 @@
           </a:bodyPr>
           <a:lstStyle/>
           <a:p>
-            <a:endParaRPr lang="en-US" sz="1600"/>
+            <a:endParaRPr lang="en-US" sz="1800" dirty="0"/>
           </a:p>
           <a:p>
             <a:pPr>
               <a:defRPr sz="2000"/>
             </a:pPr>
             <a:r>
-              <a:rPr lang="en-US" sz="1600"/>
+              <a:rPr lang="en-US" sz="1800" dirty="0"/>
               <a:t>Goal: Help users stay productive and motivated.</a:t>
             </a:r>
           </a:p>
@@ -7441,8 +8458,38 @@
               <a:defRPr sz="2000"/>
             </a:pPr>
             <a:r>
-              <a:rPr lang="en-US" sz="1600"/>
+              <a:rPr lang="en-US" sz="1800" dirty="0"/>
               <a:t>Key Features:</a:t>
+            </a:r>
+          </a:p>
+          <a:p>
+            <a:pPr marL="457200" lvl="1" indent="0">
+              <a:buNone/>
+              <a:defRPr sz="2000"/>
+            </a:pPr>
+            <a:r>
+              <a:rPr lang="en-US" sz="1400" dirty="0"/>
+              <a:t> - Add and check off tasks</a:t>
+            </a:r>
+          </a:p>
+          <a:p>
+            <a:pPr marL="457200" lvl="1" indent="0">
+              <a:buNone/>
+              <a:defRPr sz="2000"/>
+            </a:pPr>
+            <a:r>
+              <a:rPr lang="en-US" sz="1400" dirty="0"/>
+              <a:t> - Progress bar to track task completion</a:t>
+            </a:r>
+          </a:p>
+          <a:p>
+            <a:pPr marL="457200" lvl="1" indent="0">
+              <a:buNone/>
+              <a:defRPr sz="2000"/>
+            </a:pPr>
+            <a:r>
+              <a:rPr lang="en-US" sz="1400" dirty="0"/>
+              <a:t> - Motivational popup messages</a:t>
             </a:r>
           </a:p>
           <a:p>
@@ -7450,61 +8497,37 @@
               <a:defRPr sz="2000"/>
             </a:pPr>
             <a:r>
-              <a:rPr lang="en-US" sz="1600"/>
-              <a:t> - Add and check off tasks</a:t>
+              <a:rPr lang="en-US" sz="1800" dirty="0"/>
+              <a:t>Inspiration Sources:</a:t>
             </a:r>
           </a:p>
           <a:p>
-            <a:pPr>
+            <a:pPr marL="457200" lvl="1" indent="0">
+              <a:buNone/>
               <a:defRPr sz="2000"/>
             </a:pPr>
             <a:r>
-              <a:rPr lang="en-US" sz="1600"/>
-              <a:t> - Progress bar to track task completion</a:t>
+              <a:rPr lang="en-US" sz="1400" dirty="0"/>
+              <a:t> - Habitica, Todoist</a:t>
             </a:r>
           </a:p>
           <a:p>
-            <a:pPr>
+            <a:pPr marL="457200" lvl="1" indent="0">
+              <a:buNone/>
               <a:defRPr sz="2000"/>
             </a:pPr>
             <a:r>
-              <a:rPr lang="en-US" sz="1600"/>
-              <a:t> - Motivational popup messages</a:t>
+              <a:rPr lang="en-US" sz="1400" dirty="0"/>
+              <a:t> - GitHub task manager projects</a:t>
             </a:r>
           </a:p>
           <a:p>
-            <a:pPr>
+            <a:pPr marL="457200" lvl="1" indent="0">
+              <a:buNone/>
               <a:defRPr sz="2000"/>
             </a:pPr>
             <a:r>
-              <a:rPr lang="en-US" sz="1600"/>
-              <a:t>Inspiration Sources:</a:t>
-            </a:r>
-          </a:p>
-          <a:p>
-            <a:pPr>
-              <a:defRPr sz="2000"/>
-            </a:pPr>
-            <a:r>
-              <a:rPr lang="en-US" sz="1600"/>
-              <a:t> - Habitica, Todoist</a:t>
-            </a:r>
-          </a:p>
-          <a:p>
-            <a:pPr>
-              <a:defRPr sz="2000"/>
-            </a:pPr>
-            <a:r>
-              <a:rPr lang="en-US" sz="1600"/>
-              <a:t> - GitHub task manager projects</a:t>
-            </a:r>
-          </a:p>
-          <a:p>
-            <a:pPr>
-              <a:defRPr sz="2000"/>
-            </a:pPr>
-            <a:r>
-              <a:rPr lang="en-US" sz="1600"/>
+              <a:rPr lang="en-US" sz="1400" dirty="0"/>
               <a:t> - Python GUI tutorials</a:t>
             </a:r>
           </a:p>
@@ -7525,7 +8548,7 @@
           <p:nvPr/>
         </p:nvPicPr>
         <p:blipFill>
-          <a:blip r:embed="rId2"/>
+          <a:blip r:embed="rId4"/>
           <a:srcRect l="18834" r="19097" b="1"/>
           <a:stretch/>
         </p:blipFill>
@@ -7539,15 +8562,142 @@
           </a:prstGeom>
         </p:spPr>
       </p:pic>
+      <p:pic>
+        <p:nvPicPr>
+          <p:cNvPr id="5" name="Audio Recording May 1, 2025 at 9:36:47 AM">
+            <a:hlinkClick r:id="" action="ppaction://media"/>
+            <a:extLst>
+              <a:ext uri="{FF2B5EF4-FFF2-40B4-BE49-F238E27FC236}">
+                <a16:creationId xmlns:a16="http://schemas.microsoft.com/office/drawing/2014/main" id="{3350C387-5717-FB86-930E-8B744BF6815F}"/>
+              </a:ext>
+            </a:extLst>
+          </p:cNvPr>
+          <p:cNvPicPr>
+            <a:picLocks noChangeAspect="1"/>
+          </p:cNvPicPr>
+          <p:nvPr>
+            <a:audioFile r:link="rId1"/>
+            <p:extLst>
+              <p:ext uri="{DAA4B4D4-6D71-4841-9C94-3DE7FCFB9230}">
+                <p14:media xmlns:p14="http://schemas.microsoft.com/office/powerpoint/2010/main" r:embed="rId2">
+                  <p14:trim st="24037.2398" end="17062.8419"/>
+                </p14:media>
+              </p:ext>
+            </p:extLst>
+          </p:nvPr>
+        </p:nvPicPr>
+        <p:blipFill>
+          <a:blip r:embed="rId5"/>
+          <a:stretch>
+            <a:fillRect/>
+          </a:stretch>
+        </p:blipFill>
+        <p:spPr>
+          <a:xfrm>
+            <a:off x="12066" y="6193574"/>
+            <a:ext cx="634321" cy="634321"/>
+          </a:xfrm>
+          <a:prstGeom prst="rect">
+            <a:avLst/>
+          </a:prstGeom>
+        </p:spPr>
+      </p:pic>
     </p:spTree>
   </p:cSld>
   <p:clrMapOvr>
     <a:masterClrMapping/>
   </p:clrMapOvr>
+  <p:timing>
+    <p:tnLst>
+      <p:par>
+        <p:cTn id="1" dur="indefinite" restart="never" nodeType="tmRoot">
+          <p:childTnLst>
+            <p:seq concurrent="1" nextAc="seek">
+              <p:cTn id="2" dur="indefinite" nodeType="mainSeq">
+                <p:childTnLst>
+                  <p:par>
+                    <p:cTn id="3" fill="hold">
+                      <p:stCondLst>
+                        <p:cond delay="indefinite"/>
+                        <p:cond evt="onBegin" delay="0">
+                          <p:tn val="2"/>
+                        </p:cond>
+                      </p:stCondLst>
+                      <p:childTnLst>
+                        <p:par>
+                          <p:cTn id="4" fill="hold">
+                            <p:stCondLst>
+                              <p:cond delay="0"/>
+                            </p:stCondLst>
+                            <p:childTnLst>
+                              <p:par>
+                                <p:cTn id="5" presetID="1" presetClass="mediacall" presetSubtype="0" fill="hold" nodeType="afterEffect">
+                                  <p:stCondLst>
+                                    <p:cond delay="0"/>
+                                  </p:stCondLst>
+                                  <p:childTnLst>
+                                    <p:cmd type="call" cmd="playFrom(0.0)">
+                                      <p:cBhvr>
+                                        <p:cTn id="6" dur="113967" fill="hold"/>
+                                        <p:tgtEl>
+                                          <p:spTgt spid="5"/>
+                                        </p:tgtEl>
+                                      </p:cBhvr>
+                                    </p:cmd>
+                                  </p:childTnLst>
+                                </p:cTn>
+                              </p:par>
+                            </p:childTnLst>
+                          </p:cTn>
+                        </p:par>
+                      </p:childTnLst>
+                    </p:cTn>
+                  </p:par>
+                </p:childTnLst>
+              </p:cTn>
+              <p:prevCondLst>
+                <p:cond evt="onPrev" delay="0">
+                  <p:tgtEl>
+                    <p:sldTgt/>
+                  </p:tgtEl>
+                </p:cond>
+              </p:prevCondLst>
+              <p:nextCondLst>
+                <p:cond evt="onNext" delay="0">
+                  <p:tgtEl>
+                    <p:sldTgt/>
+                  </p:tgtEl>
+                </p:cond>
+              </p:nextCondLst>
+            </p:seq>
+            <p:audio>
+              <p:cMediaNode vol="56061">
+                <p:cTn id="7" fill="hold" display="0">
+                  <p:stCondLst>
+                    <p:cond delay="indefinite"/>
+                  </p:stCondLst>
+                  <p:endCondLst>
+                    <p:cond evt="onStopAudio" delay="0">
+                      <p:tgtEl>
+                        <p:sldTgt/>
+                      </p:tgtEl>
+                    </p:cond>
+                  </p:endCondLst>
+                </p:cTn>
+                <p:tgtEl>
+                  <p:spTgt spid="5"/>
+                </p:tgtEl>
+              </p:cMediaNode>
+            </p:audio>
+          </p:childTnLst>
+        </p:cTn>
+      </p:par>
+    </p:tnLst>
+  </p:timing>
 </p:sld>
 </file>
 
-<file path=ppt/slides/slide3.xml><?xml version="1.0" encoding="utf-8"?>
+<file path=ppt/slides/slide4.xml><?xml version="1.0" encoding="utf-8"?>
 <p:sld xmlns:a="http://schemas.openxmlformats.org/drawingml/2006/main" xmlns:r="http://schemas.openxmlformats.org/officeDocument/2006/relationships" xmlns:p="http://schemas.openxmlformats.org/presentationml/2006/main">
   <p:cSld>
     <p:bg>
@@ -7722,7 +8872,7 @@
           </a:lstStyle>
           <a:p>
             <a:pPr algn="ctr"/>
-            <a:endParaRPr lang="en-US"/>
+            <a:endParaRPr lang="en-US" dirty="0"/>
           </a:p>
         </p:txBody>
       </p:sp>
@@ -7789,7 +8939,7 @@
           <a:lstStyle/>
           <a:p>
             <a:pPr algn="ctr"/>
-            <a:endParaRPr lang="en-US"/>
+            <a:endParaRPr lang="en-US" dirty="0"/>
           </a:p>
         </p:txBody>
       </p:sp>
@@ -7816,7 +8966,7 @@
           <a:lstStyle/>
           <a:p>
             <a:r>
-              <a:rPr lang="en-US" sz="4000"/>
+              <a:rPr lang="en-US" sz="4000" dirty="0"/>
               <a:t>Development Journey</a:t>
             </a:r>
           </a:p>
@@ -7844,14 +8994,14 @@
           </a:bodyPr>
           <a:lstStyle/>
           <a:p>
-            <a:endParaRPr lang="en-US" sz="2000"/>
+            <a:endParaRPr lang="en-US" sz="2000" dirty="0"/>
           </a:p>
           <a:p>
             <a:pPr>
               <a:defRPr sz="2000"/>
             </a:pPr>
             <a:r>
-              <a:rPr lang="en-US" sz="2000"/>
+              <a:rPr lang="en-US" sz="2000" dirty="0"/>
               <a:t>Started with a simple checklist idea.</a:t>
             </a:r>
           </a:p>
@@ -7860,7 +9010,7 @@
               <a:defRPr sz="2000"/>
             </a:pPr>
             <a:r>
-              <a:rPr lang="en-US" sz="2000"/>
+              <a:rPr lang="en-US" sz="2000" dirty="0"/>
               <a:t>Expanded to include progress bar and motivational popups.</a:t>
             </a:r>
           </a:p>
@@ -7869,7 +9019,7 @@
               <a:defRPr sz="2000"/>
             </a:pPr>
             <a:r>
-              <a:rPr lang="en-US" sz="2000"/>
+              <a:rPr lang="en-US" sz="2000" dirty="0"/>
               <a:t>Challenges: Merging multiple features into one app.</a:t>
             </a:r>
           </a:p>
@@ -7878,7 +9028,7 @@
               <a:defRPr sz="2000"/>
             </a:pPr>
             <a:r>
-              <a:rPr lang="en-US" sz="2000"/>
+              <a:rPr lang="en-US" sz="2000" dirty="0"/>
               <a:t>Solutions:</a:t>
             </a:r>
           </a:p>
@@ -7887,7 +9037,7 @@
               <a:defRPr sz="2000"/>
             </a:pPr>
             <a:r>
-              <a:rPr lang="en-US" sz="2000"/>
+              <a:rPr lang="en-US" sz="2000" dirty="0"/>
               <a:t> - Learned from GitHub examples and tutorials</a:t>
             </a:r>
           </a:p>
@@ -7896,7 +9046,7 @@
               <a:defRPr sz="2000"/>
             </a:pPr>
             <a:r>
-              <a:rPr lang="en-US" sz="2000"/>
+              <a:rPr lang="en-US" sz="2000" dirty="0"/>
               <a:t> - Tested each function separately</a:t>
             </a:r>
           </a:p>
@@ -7917,7 +9067,7 @@
           <p:nvPr/>
         </p:nvPicPr>
         <p:blipFill>
-          <a:blip r:embed="rId2"/>
+          <a:blip r:embed="rId4"/>
           <a:srcRect r="11012"/>
           <a:stretch/>
         </p:blipFill>
@@ -7931,15 +9081,142 @@
           </a:prstGeom>
         </p:spPr>
       </p:pic>
+      <p:pic>
+        <p:nvPicPr>
+          <p:cNvPr id="4" name="Audio Recording May 1, 2025 at 10:01:12 AM">
+            <a:hlinkClick r:id="" action="ppaction://media"/>
+            <a:extLst>
+              <a:ext uri="{FF2B5EF4-FFF2-40B4-BE49-F238E27FC236}">
+                <a16:creationId xmlns:a16="http://schemas.microsoft.com/office/drawing/2014/main" id="{2BC5A7D8-A1B4-CCE4-4087-9D24A34312F8}"/>
+              </a:ext>
+            </a:extLst>
+          </p:cNvPr>
+          <p:cNvPicPr>
+            <a:picLocks noChangeAspect="1"/>
+          </p:cNvPicPr>
+          <p:nvPr>
+            <a:audioFile r:link="rId1"/>
+            <p:extLst>
+              <p:ext uri="{DAA4B4D4-6D71-4841-9C94-3DE7FCFB9230}">
+                <p14:media xmlns:p14="http://schemas.microsoft.com/office/powerpoint/2010/main" r:embed="rId2">
+                  <p14:trim st="17016.1145" end="9153.2985"/>
+                </p14:media>
+              </p:ext>
+            </p:extLst>
+          </p:nvPr>
+        </p:nvPicPr>
+        <p:blipFill>
+          <a:blip r:embed="rId5"/>
+          <a:stretch>
+            <a:fillRect/>
+          </a:stretch>
+        </p:blipFill>
+        <p:spPr>
+          <a:xfrm>
+            <a:off x="-6828" y="6101404"/>
+            <a:ext cx="812800" cy="812800"/>
+          </a:xfrm>
+          <a:prstGeom prst="rect">
+            <a:avLst/>
+          </a:prstGeom>
+        </p:spPr>
+      </p:pic>
     </p:spTree>
   </p:cSld>
   <p:clrMapOvr>
     <a:masterClrMapping/>
   </p:clrMapOvr>
+  <p:timing>
+    <p:tnLst>
+      <p:par>
+        <p:cTn id="1" dur="indefinite" restart="never" nodeType="tmRoot">
+          <p:childTnLst>
+            <p:seq concurrent="1" nextAc="seek">
+              <p:cTn id="2" dur="indefinite" nodeType="mainSeq">
+                <p:childTnLst>
+                  <p:par>
+                    <p:cTn id="3" fill="hold">
+                      <p:stCondLst>
+                        <p:cond delay="indefinite"/>
+                        <p:cond evt="onBegin" delay="0">
+                          <p:tn val="2"/>
+                        </p:cond>
+                      </p:stCondLst>
+                      <p:childTnLst>
+                        <p:par>
+                          <p:cTn id="4" fill="hold">
+                            <p:stCondLst>
+                              <p:cond delay="0"/>
+                            </p:stCondLst>
+                            <p:childTnLst>
+                              <p:par>
+                                <p:cTn id="5" presetID="1" presetClass="mediacall" presetSubtype="0" fill="hold" nodeType="afterEffect">
+                                  <p:stCondLst>
+                                    <p:cond delay="0"/>
+                                  </p:stCondLst>
+                                  <p:childTnLst>
+                                    <p:cmd type="call" cmd="playFrom(0.0)">
+                                      <p:cBhvr>
+                                        <p:cTn id="6" dur="164546" fill="hold"/>
+                                        <p:tgtEl>
+                                          <p:spTgt spid="4"/>
+                                        </p:tgtEl>
+                                      </p:cBhvr>
+                                    </p:cmd>
+                                  </p:childTnLst>
+                                </p:cTn>
+                              </p:par>
+                            </p:childTnLst>
+                          </p:cTn>
+                        </p:par>
+                      </p:childTnLst>
+                    </p:cTn>
+                  </p:par>
+                </p:childTnLst>
+              </p:cTn>
+              <p:prevCondLst>
+                <p:cond evt="onPrev" delay="0">
+                  <p:tgtEl>
+                    <p:sldTgt/>
+                  </p:tgtEl>
+                </p:cond>
+              </p:prevCondLst>
+              <p:nextCondLst>
+                <p:cond evt="onNext" delay="0">
+                  <p:tgtEl>
+                    <p:sldTgt/>
+                  </p:tgtEl>
+                </p:cond>
+              </p:nextCondLst>
+            </p:seq>
+            <p:audio>
+              <p:cMediaNode vol="80000">
+                <p:cTn id="7" fill="hold" display="0">
+                  <p:stCondLst>
+                    <p:cond delay="indefinite"/>
+                  </p:stCondLst>
+                  <p:endCondLst>
+                    <p:cond evt="onStopAudio" delay="0">
+                      <p:tgtEl>
+                        <p:sldTgt/>
+                      </p:tgtEl>
+                    </p:cond>
+                  </p:endCondLst>
+                </p:cTn>
+                <p:tgtEl>
+                  <p:spTgt spid="4"/>
+                </p:tgtEl>
+              </p:cMediaNode>
+            </p:audio>
+          </p:childTnLst>
+        </p:cTn>
+      </p:par>
+    </p:tnLst>
+  </p:timing>
 </p:sld>
 </file>
 
-<file path=ppt/slides/slide4.xml><?xml version="1.0" encoding="utf-8"?>
+<file path=ppt/slides/slide5.xml><?xml version="1.0" encoding="utf-8"?>
 <p:sld xmlns:a="http://schemas.openxmlformats.org/drawingml/2006/main" xmlns:r="http://schemas.openxmlformats.org/officeDocument/2006/relationships" xmlns:p="http://schemas.openxmlformats.org/presentationml/2006/main">
   <p:cSld>
     <p:bg>
@@ -8020,7 +9297,7 @@
           <a:lstStyle/>
           <a:p>
             <a:pPr algn="ctr"/>
-            <a:endParaRPr lang="en-US"/>
+            <a:endParaRPr lang="en-US" dirty="0"/>
           </a:p>
         </p:txBody>
       </p:sp>
@@ -8179,7 +9456,7 @@
               <a:tabLst/>
               <a:defRPr/>
             </a:pPr>
-            <a:endParaRPr kumimoji="0" lang="en-US" sz="1800" b="0" i="0" u="none" strike="noStrike" kern="1200" cap="none" spc="0" normalizeH="0" baseline="0" noProof="0">
+            <a:endParaRPr kumimoji="0" lang="en-US" sz="1800" b="0" i="0" u="none" strike="noStrike" kern="1200" cap="none" spc="0" normalizeH="0" baseline="0" noProof="0" dirty="0">
               <a:ln>
                 <a:noFill/>
               </a:ln>
@@ -8342,7 +9619,7 @@
               <a:tabLst/>
               <a:defRPr/>
             </a:pPr>
-            <a:endParaRPr kumimoji="0" lang="en-US" sz="1800" b="0" i="0" u="none" strike="noStrike" kern="1200" cap="none" spc="0" normalizeH="0" baseline="0" noProof="0">
+            <a:endParaRPr kumimoji="0" lang="en-US" sz="1800" b="0" i="0" u="none" strike="noStrike" kern="1200" cap="none" spc="0" normalizeH="0" baseline="0" noProof="0" dirty="0">
               <a:ln>
                 <a:noFill/>
               </a:ln>
@@ -8382,7 +9659,7 @@
           <a:lstStyle/>
           <a:p>
             <a:r>
-              <a:rPr lang="en-US" sz="4000"/>
+              <a:rPr lang="en-US" sz="4000" dirty="0"/>
               <a:t>Live Demo</a:t>
             </a:r>
           </a:p>
@@ -8447,7 +9724,7 @@
           <a:lstStyle/>
           <a:p>
             <a:pPr algn="ctr"/>
-            <a:endParaRPr lang="en-US">
+            <a:endParaRPr lang="en-US" dirty="0">
               <a:solidFill>
                 <a:prstClr val="white"/>
               </a:solidFill>
@@ -8495,7 +9772,7 @@
 </p:sld>
 </file>
 
-<file path=ppt/slides/slide5.xml><?xml version="1.0" encoding="utf-8"?>
+<file path=ppt/slides/slide6.xml><?xml version="1.0" encoding="utf-8"?>
 <p:sld xmlns:a="http://schemas.openxmlformats.org/drawingml/2006/main" xmlns:r="http://schemas.openxmlformats.org/officeDocument/2006/relationships" xmlns:p="http://schemas.openxmlformats.org/presentationml/2006/main">
   <p:cSld>
     <p:bg>
@@ -8576,7 +9853,7 @@
           <a:lstStyle/>
           <a:p>
             <a:pPr algn="ctr"/>
-            <a:endParaRPr lang="en-US"/>
+            <a:endParaRPr lang="en-US" dirty="0"/>
           </a:p>
         </p:txBody>
       </p:sp>
@@ -8643,7 +9920,7 @@
           <a:lstStyle/>
           <a:p>
             <a:pPr algn="ctr"/>
-            <a:endParaRPr lang="en-US"/>
+            <a:endParaRPr lang="en-US" dirty="0"/>
           </a:p>
         </p:txBody>
       </p:sp>
@@ -8670,7 +9947,7 @@
           <a:lstStyle/>
           <a:p>
             <a:r>
-              <a:rPr lang="en-US" sz="4000"/>
+              <a:rPr lang="en-US" sz="4000" dirty="0"/>
               <a:t>Future Enhancements</a:t>
             </a:r>
           </a:p>
@@ -8691,7 +9968,7 @@
           <p:nvPr/>
         </p:nvPicPr>
         <p:blipFill>
-          <a:blip r:embed="rId2"/>
+          <a:blip r:embed="rId4"/>
           <a:srcRect l="35913" r="4753" b="-2"/>
           <a:stretch/>
         </p:blipFill>
@@ -8727,14 +10004,14 @@
           </a:bodyPr>
           <a:lstStyle/>
           <a:p>
-            <a:endParaRPr lang="en-US" sz="2000"/>
+            <a:endParaRPr lang="en-US" sz="2000" dirty="0"/>
           </a:p>
           <a:p>
             <a:pPr>
               <a:defRPr sz="2000"/>
             </a:pPr>
             <a:r>
-              <a:rPr lang="en-US" sz="2000"/>
+              <a:rPr lang="en-US" sz="2000" dirty="0"/>
               <a:t>Add Recurring Tasks feature</a:t>
             </a:r>
           </a:p>
@@ -8743,7 +10020,7 @@
               <a:defRPr sz="2000"/>
             </a:pPr>
             <a:r>
-              <a:rPr lang="en-US" sz="2000"/>
+              <a:rPr lang="en-US" sz="2000" dirty="0"/>
               <a:t>Add Calendar View</a:t>
             </a:r>
           </a:p>
@@ -8752,21 +10029,149 @@
               <a:defRPr sz="2000"/>
             </a:pPr>
             <a:r>
-              <a:rPr lang="en-US" sz="2000"/>
+              <a:rPr lang="en-US" sz="2000" dirty="0"/>
               <a:t>Build a Mobile Version using Kivy or React Native</a:t>
             </a:r>
           </a:p>
         </p:txBody>
       </p:sp>
+      <p:pic>
+        <p:nvPicPr>
+          <p:cNvPr id="6" name="Audio Recording May 1, 2025 at 12:09:04 PM">
+            <a:hlinkClick r:id="" action="ppaction://media"/>
+            <a:extLst>
+              <a:ext uri="{FF2B5EF4-FFF2-40B4-BE49-F238E27FC236}">
+                <a16:creationId xmlns:a16="http://schemas.microsoft.com/office/drawing/2014/main" id="{47A06F92-0C82-2335-CCA1-B7F7A854CCC6}"/>
+              </a:ext>
+            </a:extLst>
+          </p:cNvPr>
+          <p:cNvPicPr>
+            <a:picLocks noChangeAspect="1"/>
+          </p:cNvPicPr>
+          <p:nvPr>
+            <a:audioFile r:link="rId1"/>
+            <p:extLst>
+              <p:ext uri="{DAA4B4D4-6D71-4841-9C94-3DE7FCFB9230}">
+                <p14:media xmlns:p14="http://schemas.microsoft.com/office/powerpoint/2010/main" r:embed="rId2">
+                  <p14:trim st="13587.473" end="788.1218"/>
+                  <p14:fade in="257.1483"/>
+                </p14:media>
+              </p:ext>
+            </p:extLst>
+          </p:nvPr>
+        </p:nvPicPr>
+        <p:blipFill>
+          <a:blip r:embed="rId5"/>
+          <a:stretch>
+            <a:fillRect/>
+          </a:stretch>
+        </p:blipFill>
+        <p:spPr>
+          <a:xfrm>
+            <a:off x="11379200" y="6045200"/>
+            <a:ext cx="812800" cy="812800"/>
+          </a:xfrm>
+          <a:prstGeom prst="rect">
+            <a:avLst/>
+          </a:prstGeom>
+        </p:spPr>
+      </p:pic>
     </p:spTree>
   </p:cSld>
   <p:clrMapOvr>
     <a:masterClrMapping/>
   </p:clrMapOvr>
+  <p:timing>
+    <p:tnLst>
+      <p:par>
+        <p:cTn id="1" dur="indefinite" restart="never" nodeType="tmRoot">
+          <p:childTnLst>
+            <p:seq concurrent="1" nextAc="seek">
+              <p:cTn id="2" dur="indefinite" nodeType="mainSeq">
+                <p:childTnLst>
+                  <p:par>
+                    <p:cTn id="3" fill="hold">
+                      <p:stCondLst>
+                        <p:cond delay="indefinite"/>
+                        <p:cond evt="onBegin" delay="0">
+                          <p:tn val="2"/>
+                        </p:cond>
+                      </p:stCondLst>
+                      <p:childTnLst>
+                        <p:par>
+                          <p:cTn id="4" fill="hold">
+                            <p:stCondLst>
+                              <p:cond delay="0"/>
+                            </p:stCondLst>
+                            <p:childTnLst>
+                              <p:par>
+                                <p:cTn id="5" presetID="1" presetClass="mediacall" presetSubtype="0" fill="hold" nodeType="afterEffect">
+                                  <p:stCondLst>
+                                    <p:cond delay="0"/>
+                                  </p:stCondLst>
+                                  <p:childTnLst>
+                                    <p:cmd type="call" cmd="playFrom(0.0)">
+                                      <p:cBhvr>
+                                        <p:cTn id="6" dur="47828" fill="hold"/>
+                                        <p:tgtEl>
+                                          <p:spTgt spid="6"/>
+                                        </p:tgtEl>
+                                      </p:cBhvr>
+                                    </p:cmd>
+                                  </p:childTnLst>
+                                </p:cTn>
+                              </p:par>
+                            </p:childTnLst>
+                          </p:cTn>
+                        </p:par>
+                      </p:childTnLst>
+                    </p:cTn>
+                  </p:par>
+                </p:childTnLst>
+              </p:cTn>
+              <p:prevCondLst>
+                <p:cond evt="onPrev" delay="0">
+                  <p:tgtEl>
+                    <p:sldTgt/>
+                  </p:tgtEl>
+                </p:cond>
+              </p:prevCondLst>
+              <p:nextCondLst>
+                <p:cond evt="onNext" delay="0">
+                  <p:tgtEl>
+                    <p:sldTgt/>
+                  </p:tgtEl>
+                </p:cond>
+              </p:nextCondLst>
+            </p:seq>
+            <p:audio>
+              <p:cMediaNode vol="80000">
+                <p:cTn id="7" fill="hold" display="0">
+                  <p:stCondLst>
+                    <p:cond delay="indefinite"/>
+                  </p:stCondLst>
+                  <p:endCondLst>
+                    <p:cond evt="onStopAudio" delay="0">
+                      <p:tgtEl>
+                        <p:sldTgt/>
+                      </p:tgtEl>
+                    </p:cond>
+                  </p:endCondLst>
+                </p:cTn>
+                <p:tgtEl>
+                  <p:spTgt spid="6"/>
+                </p:tgtEl>
+              </p:cMediaNode>
+            </p:audio>
+          </p:childTnLst>
+        </p:cTn>
+      </p:par>
+    </p:tnLst>
+  </p:timing>
 </p:sld>
 </file>
 
-<file path=ppt/slides/slide6.xml><?xml version="1.0" encoding="utf-8"?>
+<file path=ppt/slides/slide7.xml><?xml version="1.0" encoding="utf-8"?>
 <p:sld xmlns:a="http://schemas.openxmlformats.org/drawingml/2006/main" xmlns:r="http://schemas.openxmlformats.org/officeDocument/2006/relationships" xmlns:p="http://schemas.openxmlformats.org/presentationml/2006/main">
   <p:cSld>
     <p:bg>
@@ -8847,7 +10252,7 @@
           <a:lstStyle/>
           <a:p>
             <a:pPr algn="ctr"/>
-            <a:endParaRPr lang="en-US"/>
+            <a:endParaRPr lang="en-US" dirty="0"/>
           </a:p>
         </p:txBody>
       </p:sp>
@@ -8880,7 +10285,7 @@
           <a:lstStyle/>
           <a:p>
             <a:r>
-              <a:rPr lang="en-US" sz="5400"/>
+              <a:rPr lang="en-US" sz="5400" dirty="0"/>
               <a:t>Thank you for your time!</a:t>
             </a:r>
           </a:p>
@@ -8901,7 +10306,7 @@
           <p:nvPr/>
         </p:nvPicPr>
         <p:blipFill>
-          <a:blip r:embed="rId2"/>
+          <a:blip r:embed="rId5"/>
           <a:srcRect l="24137" r="30702"/>
           <a:stretch/>
         </p:blipFill>
@@ -9366,10 +10771,50 @@
           <a:lstStyle/>
           <a:p>
             <a:pPr algn="ctr"/>
-            <a:endParaRPr lang="en-US"/>
+            <a:endParaRPr lang="en-US" dirty="0"/>
           </a:p>
         </p:txBody>
       </p:sp>
+      <p:pic>
+        <p:nvPicPr>
+          <p:cNvPr id="2" name="Audio Recording May 1, 2025 at 11:50:04 AM">
+            <a:hlinkClick r:id="" action="ppaction://media"/>
+            <a:extLst>
+              <a:ext uri="{FF2B5EF4-FFF2-40B4-BE49-F238E27FC236}">
+                <a16:creationId xmlns:a16="http://schemas.microsoft.com/office/drawing/2014/main" id="{D9F680F5-A670-C858-5225-BC711352DBFC}"/>
+              </a:ext>
+            </a:extLst>
+          </p:cNvPr>
+          <p:cNvPicPr>
+            <a:picLocks noChangeAspect="1"/>
+          </p:cNvPicPr>
+          <p:nvPr>
+            <a:audioFile r:link="rId1"/>
+            <p:extLst>
+              <p:ext uri="{DAA4B4D4-6D71-4841-9C94-3DE7FCFB9230}">
+                <p14:media xmlns:p14="http://schemas.microsoft.com/office/powerpoint/2010/main" r:embed="rId2">
+                  <p14:trim st="19051.8542" end="7427.7885"/>
+                </p14:media>
+              </p:ext>
+            </p:extLst>
+          </p:nvPr>
+        </p:nvPicPr>
+        <p:blipFill>
+          <a:blip r:embed="rId6"/>
+          <a:stretch>
+            <a:fillRect/>
+          </a:stretch>
+        </p:blipFill>
+        <p:spPr>
+          <a:xfrm>
+            <a:off x="11363434" y="6004209"/>
+            <a:ext cx="812800" cy="812800"/>
+          </a:xfrm>
+          <a:prstGeom prst="rect">
+            <a:avLst/>
+          </a:prstGeom>
+        </p:spPr>
+      </p:pic>
     </p:spTree>
     <p:extLst>
       <p:ext uri="{BB962C8B-B14F-4D97-AF65-F5344CB8AC3E}">
@@ -9380,6 +10825,93 @@
   <p:clrMapOvr>
     <a:masterClrMapping/>
   </p:clrMapOvr>
+  <p:timing>
+    <p:tnLst>
+      <p:par>
+        <p:cTn id="1" dur="indefinite" restart="never" nodeType="tmRoot">
+          <p:childTnLst>
+            <p:seq concurrent="1" nextAc="seek">
+              <p:cTn id="2" dur="indefinite" nodeType="mainSeq">
+                <p:childTnLst>
+                  <p:par>
+                    <p:cTn id="3" fill="hold">
+                      <p:stCondLst>
+                        <p:cond delay="indefinite"/>
+                        <p:cond evt="onBegin" delay="0">
+                          <p:tn val="2"/>
+                        </p:cond>
+                      </p:stCondLst>
+                      <p:childTnLst>
+                        <p:par>
+                          <p:cTn id="4" fill="hold">
+                            <p:stCondLst>
+                              <p:cond delay="0"/>
+                            </p:stCondLst>
+                            <p:childTnLst>
+                              <p:par>
+                                <p:cTn id="5" presetID="1" presetClass="mediacall" presetSubtype="0" fill="hold" nodeType="afterEffect">
+                                  <p:stCondLst>
+                                    <p:cond delay="0"/>
+                                  </p:stCondLst>
+                                  <p:childTnLst>
+                                    <p:cmd type="call" cmd="playFrom(0.0)">
+                                      <p:cBhvr>
+                                        <p:cTn id="6" dur="28108" fill="hold"/>
+                                        <p:tgtEl>
+                                          <p:spTgt spid="2"/>
+                                        </p:tgtEl>
+                                      </p:cBhvr>
+                                    </p:cmd>
+                                  </p:childTnLst>
+                                </p:cTn>
+                              </p:par>
+                            </p:childTnLst>
+                          </p:cTn>
+                        </p:par>
+                      </p:childTnLst>
+                    </p:cTn>
+                  </p:par>
+                </p:childTnLst>
+              </p:cTn>
+              <p:prevCondLst>
+                <p:cond evt="onPrev" delay="0">
+                  <p:tgtEl>
+                    <p:sldTgt/>
+                  </p:tgtEl>
+                </p:cond>
+              </p:prevCondLst>
+              <p:nextCondLst>
+                <p:cond evt="onNext" delay="0">
+                  <p:tgtEl>
+                    <p:sldTgt/>
+                  </p:tgtEl>
+                </p:cond>
+              </p:nextCondLst>
+            </p:seq>
+            <p:audio>
+              <p:cMediaNode vol="80000">
+                <p:cTn id="7" fill="hold" display="0">
+                  <p:stCondLst>
+                    <p:cond delay="indefinite"/>
+                  </p:stCondLst>
+                  <p:endCondLst>
+                    <p:cond evt="onStopAudio" delay="0">
+                      <p:tgtEl>
+                        <p:sldTgt/>
+                      </p:tgtEl>
+                    </p:cond>
+                  </p:endCondLst>
+                </p:cTn>
+                <p:tgtEl>
+                  <p:spTgt spid="2"/>
+                </p:tgtEl>
+              </p:cMediaNode>
+            </p:audio>
+          </p:childTnLst>
+        </p:cTn>
+      </p:par>
+    </p:tnLst>
+  </p:timing>
 </p:sld>
 </file>
 
@@ -9696,4 +11228,319 @@
     </a:ext>
   </a:extLst>
 </a:theme>
+</file>
+
+<file path=ppt/theme/theme2.xml><?xml version="1.0" encoding="utf-8"?>
+<a:theme xmlns:a="http://schemas.openxmlformats.org/drawingml/2006/main" name="Office Theme">
+  <a:themeElements>
+    <a:clrScheme name="Office">
+      <a:dk1>
+        <a:sysClr val="windowText" lastClr="000000"/>
+      </a:dk1>
+      <a:lt1>
+        <a:sysClr val="window" lastClr="FFFFFF"/>
+      </a:lt1>
+      <a:dk2>
+        <a:srgbClr val="0E2841"/>
+      </a:dk2>
+      <a:lt2>
+        <a:srgbClr val="E8E8E8"/>
+      </a:lt2>
+      <a:accent1>
+        <a:srgbClr val="156082"/>
+      </a:accent1>
+      <a:accent2>
+        <a:srgbClr val="E97132"/>
+      </a:accent2>
+      <a:accent3>
+        <a:srgbClr val="196B24"/>
+      </a:accent3>
+      <a:accent4>
+        <a:srgbClr val="0F9ED5"/>
+      </a:accent4>
+      <a:accent5>
+        <a:srgbClr val="A02B93"/>
+      </a:accent5>
+      <a:accent6>
+        <a:srgbClr val="4EA72E"/>
+      </a:accent6>
+      <a:hlink>
+        <a:srgbClr val="467886"/>
+      </a:hlink>
+      <a:folHlink>
+        <a:srgbClr val="96607D"/>
+      </a:folHlink>
+    </a:clrScheme>
+    <a:fontScheme name="Office">
+      <a:majorFont>
+        <a:latin typeface="Aptos Display" panose="02110004020202020204"/>
+        <a:ea typeface=""/>
+        <a:cs typeface=""/>
+        <a:font script="Jpan" typeface="游ゴシック Light"/>
+        <a:font script="Hang" typeface="맑은 고딕"/>
+        <a:font script="Hans" typeface="等线 Light"/>
+        <a:font script="Hant" typeface="新細明體"/>
+        <a:font script="Arab" typeface="Times New Roman"/>
+        <a:font script="Hebr" typeface="Times New Roman"/>
+        <a:font script="Thai" typeface="Angsana New"/>
+        <a:font script="Ethi" typeface="Nyala"/>
+        <a:font script="Beng" typeface="Vrinda"/>
+        <a:font script="Gujr" typeface="Shruti"/>
+        <a:font script="Khmr" typeface="MoolBoran"/>
+        <a:font script="Knda" typeface="Tunga"/>
+        <a:font script="Guru" typeface="Raavi"/>
+        <a:font script="Cans" typeface="Euphemia"/>
+        <a:font script="Cher" typeface="Plantagenet Cherokee"/>
+        <a:font script="Yiii" typeface="Microsoft Yi Baiti"/>
+        <a:font script="Tibt" typeface="Microsoft Himalaya"/>
+        <a:font script="Thaa" typeface="MV Boli"/>
+        <a:font script="Deva" typeface="Mangal"/>
+        <a:font script="Telu" typeface="Gautami"/>
+        <a:font script="Taml" typeface="Latha"/>
+        <a:font script="Syrc" typeface="Estrangelo Edessa"/>
+        <a:font script="Orya" typeface="Kalinga"/>
+        <a:font script="Mlym" typeface="Kartika"/>
+        <a:font script="Laoo" typeface="DokChampa"/>
+        <a:font script="Sinh" typeface="Iskoola Pota"/>
+        <a:font script="Mong" typeface="Mongolian Baiti"/>
+        <a:font script="Viet" typeface="Times New Roman"/>
+        <a:font script="Uigh" typeface="Microsoft Uighur"/>
+        <a:font script="Geor" typeface="Sylfaen"/>
+        <a:font script="Armn" typeface="Arial"/>
+        <a:font script="Bugi" typeface="Leelawadee UI"/>
+        <a:font script="Bopo" typeface="Microsoft JhengHei"/>
+        <a:font script="Java" typeface="Javanese Text"/>
+        <a:font script="Lisu" typeface="Segoe UI"/>
+        <a:font script="Mymr" typeface="Myanmar Text"/>
+        <a:font script="Nkoo" typeface="Ebrima"/>
+        <a:font script="Olck" typeface="Nirmala UI"/>
+        <a:font script="Osma" typeface="Ebrima"/>
+        <a:font script="Phag" typeface="Phagspa"/>
+        <a:font script="Syrn" typeface="Estrangelo Edessa"/>
+        <a:font script="Syrj" typeface="Estrangelo Edessa"/>
+        <a:font script="Syre" typeface="Estrangelo Edessa"/>
+        <a:font script="Sora" typeface="Nirmala UI"/>
+        <a:font script="Tale" typeface="Microsoft Tai Le"/>
+        <a:font script="Talu" typeface="Microsoft New Tai Lue"/>
+        <a:font script="Tfng" typeface="Ebrima"/>
+      </a:majorFont>
+      <a:minorFont>
+        <a:latin typeface="Aptos" panose="02110004020202020204"/>
+        <a:ea typeface=""/>
+        <a:cs typeface=""/>
+        <a:font script="Jpan" typeface="游ゴシック"/>
+        <a:font script="Hang" typeface="맑은 고딕"/>
+        <a:font script="Hans" typeface="等线"/>
+        <a:font script="Hant" typeface="新細明體"/>
+        <a:font script="Arab" typeface="Arial"/>
+        <a:font script="Hebr" typeface="Arial"/>
+        <a:font script="Thai" typeface="Cordia New"/>
+        <a:font script="Ethi" typeface="Nyala"/>
+        <a:font script="Beng" typeface="Vrinda"/>
+        <a:font script="Gujr" typeface="Shruti"/>
+        <a:font script="Khmr" typeface="DaunPenh"/>
+        <a:font script="Knda" typeface="Tunga"/>
+        <a:font script="Guru" typeface="Raavi"/>
+        <a:font script="Cans" typeface="Euphemia"/>
+        <a:font script="Cher" typeface="Plantagenet Cherokee"/>
+        <a:font script="Yiii" typeface="Microsoft Yi Baiti"/>
+        <a:font script="Tibt" typeface="Microsoft Himalaya"/>
+        <a:font script="Thaa" typeface="MV Boli"/>
+        <a:font script="Deva" typeface="Mangal"/>
+        <a:font script="Telu" typeface="Gautami"/>
+        <a:font script="Taml" typeface="Latha"/>
+        <a:font script="Syrc" typeface="Estrangelo Edessa"/>
+        <a:font script="Orya" typeface="Kalinga"/>
+        <a:font script="Mlym" typeface="Kartika"/>
+        <a:font script="Laoo" typeface="DokChampa"/>
+        <a:font script="Sinh" typeface="Iskoola Pota"/>
+        <a:font script="Mong" typeface="Mongolian Baiti"/>
+        <a:font script="Viet" typeface="Arial"/>
+        <a:font script="Uigh" typeface="Microsoft Uighur"/>
+        <a:font script="Geor" typeface="Sylfaen"/>
+        <a:font script="Armn" typeface="Arial"/>
+        <a:font script="Bugi" typeface="Leelawadee UI"/>
+        <a:font script="Bopo" typeface="Microsoft JhengHei"/>
+        <a:font script="Java" typeface="Javanese Text"/>
+        <a:font script="Lisu" typeface="Segoe UI"/>
+        <a:font script="Mymr" typeface="Myanmar Text"/>
+        <a:font script="Nkoo" typeface="Ebrima"/>
+        <a:font script="Olck" typeface="Nirmala UI"/>
+        <a:font script="Osma" typeface="Ebrima"/>
+        <a:font script="Phag" typeface="Phagspa"/>
+        <a:font script="Syrn" typeface="Estrangelo Edessa"/>
+        <a:font script="Syrj" typeface="Estrangelo Edessa"/>
+        <a:font script="Syre" typeface="Estrangelo Edessa"/>
+        <a:font script="Sora" typeface="Nirmala UI"/>
+        <a:font script="Tale" typeface="Microsoft Tai Le"/>
+        <a:font script="Talu" typeface="Microsoft New Tai Lue"/>
+        <a:font script="Tfng" typeface="Ebrima"/>
+      </a:minorFont>
+    </a:fontScheme>
+    <a:fmtScheme name="Office">
+      <a:fillStyleLst>
+        <a:solidFill>
+          <a:schemeClr val="phClr"/>
+        </a:solidFill>
+        <a:gradFill rotWithShape="1">
+          <a:gsLst>
+            <a:gs pos="0">
+              <a:schemeClr val="phClr">
+                <a:lumMod val="110000"/>
+                <a:satMod val="105000"/>
+                <a:tint val="67000"/>
+              </a:schemeClr>
+            </a:gs>
+            <a:gs pos="50000">
+              <a:schemeClr val="phClr">
+                <a:lumMod val="105000"/>
+                <a:satMod val="103000"/>
+                <a:tint val="73000"/>
+              </a:schemeClr>
+            </a:gs>
+            <a:gs pos="100000">
+              <a:schemeClr val="phClr">
+                <a:lumMod val="105000"/>
+                <a:satMod val="109000"/>
+                <a:tint val="81000"/>
+              </a:schemeClr>
+            </a:gs>
+          </a:gsLst>
+          <a:lin ang="5400000" scaled="0"/>
+        </a:gradFill>
+        <a:gradFill rotWithShape="1">
+          <a:gsLst>
+            <a:gs pos="0">
+              <a:schemeClr val="phClr">
+                <a:satMod val="103000"/>
+                <a:lumMod val="102000"/>
+                <a:tint val="94000"/>
+              </a:schemeClr>
+            </a:gs>
+            <a:gs pos="50000">
+              <a:schemeClr val="phClr">
+                <a:satMod val="110000"/>
+                <a:lumMod val="100000"/>
+                <a:shade val="100000"/>
+              </a:schemeClr>
+            </a:gs>
+            <a:gs pos="100000">
+              <a:schemeClr val="phClr">
+                <a:lumMod val="99000"/>
+                <a:satMod val="120000"/>
+                <a:shade val="78000"/>
+              </a:schemeClr>
+            </a:gs>
+          </a:gsLst>
+          <a:lin ang="5400000" scaled="0"/>
+        </a:gradFill>
+      </a:fillStyleLst>
+      <a:lnStyleLst>
+        <a:ln w="12700" cap="flat" cmpd="sng" algn="ctr">
+          <a:solidFill>
+            <a:schemeClr val="phClr"/>
+          </a:solidFill>
+          <a:prstDash val="solid"/>
+          <a:miter lim="800000"/>
+        </a:ln>
+        <a:ln w="19050" cap="flat" cmpd="sng" algn="ctr">
+          <a:solidFill>
+            <a:schemeClr val="phClr"/>
+          </a:solidFill>
+          <a:prstDash val="solid"/>
+          <a:miter lim="800000"/>
+        </a:ln>
+        <a:ln w="25400" cap="flat" cmpd="sng" algn="ctr">
+          <a:solidFill>
+            <a:schemeClr val="phClr"/>
+          </a:solidFill>
+          <a:prstDash val="solid"/>
+          <a:miter lim="800000"/>
+        </a:ln>
+      </a:lnStyleLst>
+      <a:effectStyleLst>
+        <a:effectStyle>
+          <a:effectLst/>
+        </a:effectStyle>
+        <a:effectStyle>
+          <a:effectLst/>
+        </a:effectStyle>
+        <a:effectStyle>
+          <a:effectLst>
+            <a:outerShdw blurRad="57150" dist="19050" dir="5400000" algn="ctr" rotWithShape="0">
+              <a:srgbClr val="000000">
+                <a:alpha val="63000"/>
+              </a:srgbClr>
+            </a:outerShdw>
+          </a:effectLst>
+        </a:effectStyle>
+      </a:effectStyleLst>
+      <a:bgFillStyleLst>
+        <a:solidFill>
+          <a:schemeClr val="phClr"/>
+        </a:solidFill>
+        <a:solidFill>
+          <a:schemeClr val="phClr">
+            <a:tint val="95000"/>
+            <a:satMod val="170000"/>
+          </a:schemeClr>
+        </a:solidFill>
+        <a:gradFill rotWithShape="1">
+          <a:gsLst>
+            <a:gs pos="0">
+              <a:schemeClr val="phClr">
+                <a:tint val="93000"/>
+                <a:satMod val="150000"/>
+                <a:shade val="98000"/>
+                <a:lumMod val="102000"/>
+              </a:schemeClr>
+            </a:gs>
+            <a:gs pos="50000">
+              <a:schemeClr val="phClr">
+                <a:tint val="98000"/>
+                <a:satMod val="130000"/>
+                <a:shade val="90000"/>
+                <a:lumMod val="103000"/>
+              </a:schemeClr>
+            </a:gs>
+            <a:gs pos="100000">
+              <a:schemeClr val="phClr">
+                <a:shade val="63000"/>
+                <a:satMod val="120000"/>
+              </a:schemeClr>
+            </a:gs>
+          </a:gsLst>
+          <a:lin ang="5400000" scaled="0"/>
+        </a:gradFill>
+      </a:bgFillStyleLst>
+    </a:fmtScheme>
+  </a:themeElements>
+  <a:objectDefaults>
+    <a:lnDef>
+      <a:spPr/>
+      <a:bodyPr/>
+      <a:lstStyle/>
+      <a:style>
+        <a:lnRef idx="2">
+          <a:schemeClr val="accent1"/>
+        </a:lnRef>
+        <a:fillRef idx="0">
+          <a:schemeClr val="accent1"/>
+        </a:fillRef>
+        <a:effectRef idx="1">
+          <a:schemeClr val="accent1"/>
+        </a:effectRef>
+        <a:fontRef idx="minor">
+          <a:schemeClr val="tx1"/>
+        </a:fontRef>
+      </a:style>
+    </a:lnDef>
+  </a:objectDefaults>
+  <a:extraClrSchemeLst/>
+  <a:extLst>
+    <a:ext uri="{05A4C25C-085E-4340-85A3-A5531E510DB2}">
+      <thm15:themeFamily xmlns:thm15="http://schemas.microsoft.com/office/thememl/2012/main" name="Office Theme" id="{2E142A2C-CD16-42D6-873A-C26D2A0506FA}" vid="{1BDDFF52-6CD6-40A5-AB3C-68EB2F1E4D0A}"/>
+    </a:ext>
+  </a:extLst>
+</a:theme>
 </file>
</xml_diff>